<commit_message>
more on interactions lecture
</commit_message>
<xml_diff>
--- a/Lectures/Lecture 08.1 Interactions.pptx
+++ b/Lectures/Lecture 08.1 Interactions.pptx
@@ -11,23 +11,23 @@
     <p:sldId id="256" r:id="rId2"/>
     <p:sldId id="348" r:id="rId3"/>
     <p:sldId id="349" r:id="rId4"/>
-    <p:sldId id="354" r:id="rId5"/>
-    <p:sldId id="351" r:id="rId6"/>
-    <p:sldId id="352" r:id="rId7"/>
-    <p:sldId id="344" r:id="rId8"/>
-    <p:sldId id="345" r:id="rId9"/>
-    <p:sldId id="342" r:id="rId10"/>
-    <p:sldId id="343" r:id="rId11"/>
-    <p:sldId id="357" r:id="rId12"/>
-    <p:sldId id="346" r:id="rId13"/>
-    <p:sldId id="347" r:id="rId14"/>
-    <p:sldId id="334" r:id="rId15"/>
-    <p:sldId id="350" r:id="rId16"/>
-    <p:sldId id="356" r:id="rId17"/>
-    <p:sldId id="355" r:id="rId18"/>
-    <p:sldId id="358" r:id="rId19"/>
-    <p:sldId id="359" r:id="rId20"/>
-    <p:sldId id="360" r:id="rId21"/>
+    <p:sldId id="361" r:id="rId5"/>
+    <p:sldId id="354" r:id="rId6"/>
+    <p:sldId id="351" r:id="rId7"/>
+    <p:sldId id="352" r:id="rId8"/>
+    <p:sldId id="344" r:id="rId9"/>
+    <p:sldId id="345" r:id="rId10"/>
+    <p:sldId id="342" r:id="rId11"/>
+    <p:sldId id="343" r:id="rId12"/>
+    <p:sldId id="357" r:id="rId13"/>
+    <p:sldId id="346" r:id="rId14"/>
+    <p:sldId id="347" r:id="rId15"/>
+    <p:sldId id="334" r:id="rId16"/>
+    <p:sldId id="350" r:id="rId17"/>
+    <p:sldId id="356" r:id="rId18"/>
+    <p:sldId id="355" r:id="rId19"/>
+    <p:sldId id="358" r:id="rId20"/>
+    <p:sldId id="362" r:id="rId21"/>
   </p:sldIdLst>
   <p:sldSz cx="12192000" cy="6858000"/>
   <p:notesSz cx="6858000" cy="9144000"/>
@@ -550,6 +550,90 @@
             <a:fld id="{98714CD8-F1CB-4604-9BDB-C09DE26B3889}" type="slidenum">
               <a:rPr lang="en-GB" smtClean="0"/>
               <a:t>4</a:t>
+            </a:fld>
+            <a:endParaRPr lang="en-GB"/>
+          </a:p>
+        </p:txBody>
+      </p:sp>
+    </p:spTree>
+    <p:extLst>
+      <p:ext uri="{BB962C8B-B14F-4D97-AF65-F5344CB8AC3E}">
+        <p14:creationId xmlns:p14="http://schemas.microsoft.com/office/powerpoint/2010/main" val="4091228088"/>
+      </p:ext>
+    </p:extLst>
+  </p:cSld>
+  <p:clrMapOvr>
+    <a:masterClrMapping/>
+  </p:clrMapOvr>
+</p:notes>
+</file>
+
+<file path=ppt/notesSlides/notesSlide2.xml><?xml version="1.0" encoding="utf-8"?>
+<p:notes xmlns:a="http://schemas.openxmlformats.org/drawingml/2006/main" xmlns:r="http://schemas.openxmlformats.org/officeDocument/2006/relationships" xmlns:p="http://schemas.openxmlformats.org/presentationml/2006/main">
+  <p:cSld>
+    <p:spTree>
+      <p:nvGrpSpPr>
+        <p:cNvPr id="1" name=""/>
+        <p:cNvGrpSpPr/>
+        <p:nvPr/>
+      </p:nvGrpSpPr>
+      <p:grpSpPr>
+        <a:xfrm>
+          <a:off x="0" y="0"/>
+          <a:ext cx="0" cy="0"/>
+          <a:chOff x="0" y="0"/>
+          <a:chExt cx="0" cy="0"/>
+        </a:xfrm>
+      </p:grpSpPr>
+      <p:sp>
+        <p:nvSpPr>
+          <p:cNvPr id="2" name="Slide Image Placeholder 1"/>
+          <p:cNvSpPr>
+            <a:spLocks noGrp="1" noRot="1" noChangeAspect="1"/>
+          </p:cNvSpPr>
+          <p:nvPr>
+            <p:ph type="sldImg"/>
+          </p:nvPr>
+        </p:nvSpPr>
+        <p:spPr/>
+      </p:sp>
+      <p:sp>
+        <p:nvSpPr>
+          <p:cNvPr id="3" name="Notes Placeholder 2"/>
+          <p:cNvSpPr>
+            <a:spLocks noGrp="1"/>
+          </p:cNvSpPr>
+          <p:nvPr>
+            <p:ph type="body" idx="1"/>
+          </p:nvPr>
+        </p:nvSpPr>
+        <p:spPr/>
+        <p:txBody>
+          <a:bodyPr/>
+          <a:lstStyle/>
+          <a:p>
+            <a:endParaRPr lang="en-GB" dirty="0"/>
+          </a:p>
+        </p:txBody>
+      </p:sp>
+      <p:sp>
+        <p:nvSpPr>
+          <p:cNvPr id="4" name="Slide Number Placeholder 3"/>
+          <p:cNvSpPr>
+            <a:spLocks noGrp="1"/>
+          </p:cNvSpPr>
+          <p:nvPr>
+            <p:ph type="sldNum" sz="quarter" idx="5"/>
+          </p:nvPr>
+        </p:nvSpPr>
+        <p:spPr/>
+        <p:txBody>
+          <a:bodyPr/>
+          <a:lstStyle/>
+          <a:p>
+            <a:fld id="{98714CD8-F1CB-4604-9BDB-C09DE26B3889}" type="slidenum">
+              <a:rPr lang="en-GB" smtClean="0"/>
+              <a:t>5</a:t>
             </a:fld>
             <a:endParaRPr lang="en-GB"/>
           </a:p>
@@ -4126,6 +4210,133 @@
             </a:pPr>
             <a:r>
               <a:rPr lang="en-GB" dirty="0"/>
+              <a:t>I add sugar to my coffee</a:t>
+            </a:r>
+          </a:p>
+        </p:txBody>
+      </p:sp>
+      <p:sp>
+        <p:nvSpPr>
+          <p:cNvPr id="4" name="Picture Placeholder 3">
+            <a:extLst>
+              <a:ext uri="{FF2B5EF4-FFF2-40B4-BE49-F238E27FC236}">
+                <a16:creationId xmlns:a16="http://schemas.microsoft.com/office/drawing/2014/main" id="{A8A1178C-90B4-6BC1-B81A-5E95D2E9B3A7}"/>
+              </a:ext>
+            </a:extLst>
+          </p:cNvPr>
+          <p:cNvSpPr>
+            <a:spLocks noGrp="1"/>
+          </p:cNvSpPr>
+          <p:nvPr>
+            <p:ph type="pic" sz="quarter" idx="10"/>
+          </p:nvPr>
+        </p:nvSpPr>
+        <p:spPr/>
+        <p:txBody>
+          <a:bodyPr/>
+          <a:lstStyle/>
+          <a:p>
+            <a:endParaRPr lang="en-GB"/>
+          </a:p>
+        </p:txBody>
+      </p:sp>
+    </p:spTree>
+    <p:extLst>
+      <p:ext uri="{BB962C8B-B14F-4D97-AF65-F5344CB8AC3E}">
+        <p14:creationId xmlns:p14="http://schemas.microsoft.com/office/powerpoint/2010/main" val="2807506647"/>
+      </p:ext>
+    </p:extLst>
+  </p:cSld>
+  <p:clrMapOvr>
+    <a:masterClrMapping/>
+  </p:clrMapOvr>
+  <mc:AlternateContent xmlns:mc="http://schemas.openxmlformats.org/markup-compatibility/2006" xmlns:p14="http://schemas.microsoft.com/office/powerpoint/2010/main">
+    <mc:Choice Requires="p14">
+      <p:transition spd="med" p14:dur="700">
+        <p:fade/>
+      </p:transition>
+    </mc:Choice>
+    <mc:Fallback xmlns="">
+      <p:transition spd="med">
+        <p:fade/>
+      </p:transition>
+    </mc:Fallback>
+  </mc:AlternateContent>
+</p:sld>
+</file>
+
+<file path=ppt/slides/slide11.xml><?xml version="1.0" encoding="utf-8"?>
+<p:sld xmlns:a="http://schemas.openxmlformats.org/drawingml/2006/main" xmlns:r="http://schemas.openxmlformats.org/officeDocument/2006/relationships" xmlns:p="http://schemas.openxmlformats.org/presentationml/2006/main">
+  <p:cSld>
+    <p:spTree>
+      <p:nvGrpSpPr>
+        <p:cNvPr id="1" name=""/>
+        <p:cNvGrpSpPr/>
+        <p:nvPr/>
+      </p:nvGrpSpPr>
+      <p:grpSpPr>
+        <a:xfrm>
+          <a:off x="0" y="0"/>
+          <a:ext cx="0" cy="0"/>
+          <a:chOff x="0" y="0"/>
+          <a:chExt cx="0" cy="0"/>
+        </a:xfrm>
+      </p:grpSpPr>
+      <p:sp>
+        <p:nvSpPr>
+          <p:cNvPr id="2" name="Title 1">
+            <a:extLst>
+              <a:ext uri="{FF2B5EF4-FFF2-40B4-BE49-F238E27FC236}">
+                <a16:creationId xmlns:a16="http://schemas.microsoft.com/office/drawing/2014/main" id="{94207DF2-8981-6110-14AC-61101BD9B34E}"/>
+              </a:ext>
+            </a:extLst>
+          </p:cNvPr>
+          <p:cNvSpPr>
+            <a:spLocks noGrp="1"/>
+          </p:cNvSpPr>
+          <p:nvPr>
+            <p:ph type="title"/>
+          </p:nvPr>
+        </p:nvSpPr>
+        <p:spPr/>
+        <p:txBody>
+          <a:bodyPr/>
+          <a:lstStyle/>
+          <a:p>
+            <a:r>
+              <a:rPr lang="en-GB" dirty="0"/>
+              <a:t>Is my coffee sweet?</a:t>
+            </a:r>
+          </a:p>
+        </p:txBody>
+      </p:sp>
+      <p:sp>
+        <p:nvSpPr>
+          <p:cNvPr id="3" name="Content Placeholder 2">
+            <a:extLst>
+              <a:ext uri="{FF2B5EF4-FFF2-40B4-BE49-F238E27FC236}">
+                <a16:creationId xmlns:a16="http://schemas.microsoft.com/office/drawing/2014/main" id="{8D680C27-FFFD-52F6-9961-11CF916FE205}"/>
+              </a:ext>
+            </a:extLst>
+          </p:cNvPr>
+          <p:cNvSpPr>
+            <a:spLocks noGrp="1"/>
+          </p:cNvSpPr>
+          <p:nvPr>
+            <p:ph idx="1"/>
+          </p:nvPr>
+        </p:nvSpPr>
+        <p:spPr/>
+        <p:txBody>
+          <a:bodyPr/>
+          <a:lstStyle/>
+          <a:p>
+            <a:pPr marL="514350" indent="-514350">
+              <a:buFont typeface="+mj-lt"/>
+              <a:buAutoNum type="arabicPeriod"/>
+            </a:pPr>
+            <a:r>
+              <a:rPr lang="en-GB" dirty="0"/>
               <a:t>Sometimes I add sugar to my coffee</a:t>
             </a:r>
           </a:p>
@@ -4346,7 +4557,7 @@
 </p:sld>
 </file>
 
-<file path=ppt/slides/slide11.xml><?xml version="1.0" encoding="utf-8"?>
+<file path=ppt/slides/slide12.xml><?xml version="1.0" encoding="utf-8"?>
 <p:sld xmlns:a="http://schemas.openxmlformats.org/drawingml/2006/main" xmlns:r="http://schemas.openxmlformats.org/officeDocument/2006/relationships" xmlns:p="http://schemas.openxmlformats.org/presentationml/2006/main">
   <p:cSld>
     <p:spTree>
@@ -4716,7 +4927,7 @@
 </p:sld>
 </file>
 
-<file path=ppt/slides/slide12.xml><?xml version="1.0" encoding="utf-8"?>
+<file path=ppt/slides/slide13.xml><?xml version="1.0" encoding="utf-8"?>
 <p:sld xmlns:a="http://schemas.openxmlformats.org/drawingml/2006/main" xmlns:r="http://schemas.openxmlformats.org/officeDocument/2006/relationships" xmlns:p="http://schemas.openxmlformats.org/presentationml/2006/main">
   <p:cSld>
     <p:spTree>
@@ -5135,7 +5346,7 @@
 </p:sld>
 </file>
 
-<file path=ppt/slides/slide13.xml><?xml version="1.0" encoding="utf-8"?>
+<file path=ppt/slides/slide14.xml><?xml version="1.0" encoding="utf-8"?>
 <p:sld xmlns:a="http://schemas.openxmlformats.org/drawingml/2006/main" xmlns:r="http://schemas.openxmlformats.org/officeDocument/2006/relationships" xmlns:p="http://schemas.openxmlformats.org/presentationml/2006/main">
   <p:cSld>
     <p:spTree>
@@ -6741,7 +6952,7 @@
 </p:sld>
 </file>
 
-<file path=ppt/slides/slide14.xml><?xml version="1.0" encoding="utf-8"?>
+<file path=ppt/slides/slide15.xml><?xml version="1.0" encoding="utf-8"?>
 <p:sld xmlns:a="http://schemas.openxmlformats.org/drawingml/2006/main" xmlns:r="http://schemas.openxmlformats.org/officeDocument/2006/relationships" xmlns:p="http://schemas.openxmlformats.org/presentationml/2006/main">
   <p:cSld>
     <p:spTree>
@@ -7716,7 +7927,7 @@
 </p:sld>
 </file>
 
-<file path=ppt/slides/slide15.xml><?xml version="1.0" encoding="utf-8"?>
+<file path=ppt/slides/slide16.xml><?xml version="1.0" encoding="utf-8"?>
 <p:sld xmlns:a="http://schemas.openxmlformats.org/drawingml/2006/main" xmlns:r="http://schemas.openxmlformats.org/officeDocument/2006/relationships" xmlns:p="http://schemas.openxmlformats.org/presentationml/2006/main">
   <p:cSld>
     <p:spTree>
@@ -9415,7 +9626,7 @@
 </p:sld>
 </file>
 
-<file path=ppt/slides/slide16.xml><?xml version="1.0" encoding="utf-8"?>
+<file path=ppt/slides/slide17.xml><?xml version="1.0" encoding="utf-8"?>
 <p:sld xmlns:a="http://schemas.openxmlformats.org/drawingml/2006/main" xmlns:r="http://schemas.openxmlformats.org/officeDocument/2006/relationships" xmlns:p="http://schemas.openxmlformats.org/presentationml/2006/main">
   <p:cSld>
     <p:spTree>
@@ -9542,7 +9753,7 @@
 </p:sld>
 </file>
 
-<file path=ppt/slides/slide17.xml><?xml version="1.0" encoding="utf-8"?>
+<file path=ppt/slides/slide18.xml><?xml version="1.0" encoding="utf-8"?>
 <p:sld xmlns:a="http://schemas.openxmlformats.org/drawingml/2006/main" xmlns:r="http://schemas.openxmlformats.org/officeDocument/2006/relationships" xmlns:p="http://schemas.openxmlformats.org/presentationml/2006/main">
   <p:cSld>
     <p:spTree>
@@ -9982,7 +10193,7 @@
 </p:sld>
 </file>
 
-<file path=ppt/slides/slide18.xml><?xml version="1.0" encoding="utf-8"?>
+<file path=ppt/slides/slide19.xml><?xml version="1.0" encoding="utf-8"?>
 <p:sld xmlns:a="http://schemas.openxmlformats.org/drawingml/2006/main" xmlns:r="http://schemas.openxmlformats.org/officeDocument/2006/relationships" xmlns:p="http://schemas.openxmlformats.org/presentationml/2006/main">
   <p:cSld>
     <p:spTree>
@@ -10052,6 +10263,22 @@
         <p:txBody>
           <a:bodyPr/>
           <a:lstStyle/>
+          <a:p>
+            <a:r>
+              <a:rPr lang="en-GB" dirty="0"/>
+              <a:t>How much do species impact crop yields? </a:t>
+            </a:r>
+          </a:p>
+          <a:p>
+            <a:r>
+              <a:rPr lang="en-GB" dirty="0"/>
+              <a:t>We want to use an interaction to specify that the impact of density on yield differs between species:</a:t>
+            </a:r>
+            <a:endParaRPr lang="en-GB" dirty="0">
+              <a:latin typeface="Courier New" panose="02070309020205020404" pitchFamily="49" charset="0"/>
+              <a:cs typeface="Courier New" panose="02070309020205020404" pitchFamily="49" charset="0"/>
+            </a:endParaRPr>
+          </a:p>
           <a:p>
             <a:r>
               <a:rPr lang="en-GB" dirty="0">
@@ -10470,748 +10697,37 @@
                       </p:childTnLst>
                     </p:cTn>
                   </p:par>
-                </p:childTnLst>
-              </p:cTn>
-              <p:prevCondLst>
-                <p:cond evt="onPrev" delay="0">
-                  <p:tgtEl>
-                    <p:sldTgt/>
-                  </p:tgtEl>
-                </p:cond>
-              </p:prevCondLst>
-              <p:nextCondLst>
-                <p:cond evt="onNext" delay="0">
-                  <p:tgtEl>
-                    <p:sldTgt/>
-                  </p:tgtEl>
-                </p:cond>
-              </p:nextCondLst>
-            </p:seq>
-          </p:childTnLst>
-        </p:cTn>
-      </p:par>
-    </p:tnLst>
-    <p:bldLst>
-      <p:bldP spid="3" grpId="0" uiExpand="1" build="p"/>
-    </p:bldLst>
-  </p:timing>
-</p:sld>
-</file>
-
-<file path=ppt/slides/slide19.xml><?xml version="1.0" encoding="utf-8"?>
-<p:sld xmlns:a="http://schemas.openxmlformats.org/drawingml/2006/main" xmlns:r="http://schemas.openxmlformats.org/officeDocument/2006/relationships" xmlns:p="http://schemas.openxmlformats.org/presentationml/2006/main">
-  <p:cSld>
-    <p:spTree>
-      <p:nvGrpSpPr>
-        <p:cNvPr id="1" name="">
-          <a:extLst>
-            <a:ext uri="{FF2B5EF4-FFF2-40B4-BE49-F238E27FC236}">
-              <a16:creationId xmlns:a16="http://schemas.microsoft.com/office/drawing/2014/main" id="{5806D716-38B6-5EE9-C1A4-94F72EAFB44B}"/>
-            </a:ext>
-          </a:extLst>
-        </p:cNvPr>
-        <p:cNvGrpSpPr/>
-        <p:nvPr/>
-      </p:nvGrpSpPr>
-      <p:grpSpPr>
-        <a:xfrm>
-          <a:off x="0" y="0"/>
-          <a:ext cx="0" cy="0"/>
-          <a:chOff x="0" y="0"/>
-          <a:chExt cx="0" cy="0"/>
-        </a:xfrm>
-      </p:grpSpPr>
-      <p:sp>
-        <p:nvSpPr>
-          <p:cNvPr id="2" name="Title 1">
-            <a:extLst>
-              <a:ext uri="{FF2B5EF4-FFF2-40B4-BE49-F238E27FC236}">
-                <a16:creationId xmlns:a16="http://schemas.microsoft.com/office/drawing/2014/main" id="{59F7E4CB-CCE1-3BEF-ABE3-5E2AB9A7FB96}"/>
-              </a:ext>
-            </a:extLst>
-          </p:cNvPr>
-          <p:cNvSpPr>
-            <a:spLocks noGrp="1"/>
-          </p:cNvSpPr>
-          <p:nvPr>
-            <p:ph type="title"/>
-          </p:nvPr>
-        </p:nvSpPr>
-        <p:spPr>
-          <a:xfrm>
-            <a:off x="0" y="0"/>
-            <a:ext cx="12192000" cy="1325563"/>
-          </a:xfrm>
-        </p:spPr>
-        <p:txBody>
-          <a:bodyPr>
-            <a:normAutofit/>
-          </a:bodyPr>
-          <a:lstStyle/>
-          <a:p>
-            <a:pPr algn="ctr"/>
-            <a:r>
-              <a:rPr lang="en-GB" sz="5400" dirty="0">
-                <a:latin typeface="Bahnschrift Light" panose="020B0502040204020203" pitchFamily="34" charset="0"/>
-              </a:rPr>
-              <a:t>What is an interaction?</a:t>
-            </a:r>
-            <a:endParaRPr lang="en-GB" sz="5400" dirty="0">
-              <a:latin typeface="Courier New" panose="02070309020205020404" pitchFamily="49" charset="0"/>
-              <a:cs typeface="Courier New" panose="02070309020205020404" pitchFamily="49" charset="0"/>
-            </a:endParaRPr>
-          </a:p>
-        </p:txBody>
-      </p:sp>
-      <p:grpSp>
-        <p:nvGrpSpPr>
-          <p:cNvPr id="43" name="Group 42">
-            <a:extLst>
-              <a:ext uri="{FF2B5EF4-FFF2-40B4-BE49-F238E27FC236}">
-                <a16:creationId xmlns:a16="http://schemas.microsoft.com/office/drawing/2014/main" id="{C0B43BCC-E368-9621-F5ED-EC343CB3ED01}"/>
-              </a:ext>
-            </a:extLst>
-          </p:cNvPr>
-          <p:cNvGrpSpPr/>
-          <p:nvPr/>
-        </p:nvGrpSpPr>
-        <p:grpSpPr>
-          <a:xfrm>
-            <a:off x="3307943" y="1325563"/>
-            <a:ext cx="5070218" cy="4998988"/>
-            <a:chOff x="4578609" y="1597025"/>
-            <a:chExt cx="5070218" cy="4998988"/>
-          </a:xfrm>
-        </p:grpSpPr>
-        <p:pic>
-          <p:nvPicPr>
-            <p:cNvPr id="44" name="Picture 43" descr="A spoonful of salt&#10;&#10;Description automatically generated">
-              <a:extLst>
-                <a:ext uri="{FF2B5EF4-FFF2-40B4-BE49-F238E27FC236}">
-                  <a16:creationId xmlns:a16="http://schemas.microsoft.com/office/drawing/2014/main" id="{346FE76B-CB0A-61D3-6C3E-8D480524638A}"/>
-                </a:ext>
-              </a:extLst>
-            </p:cNvPr>
-            <p:cNvPicPr>
-              <a:picLocks noChangeAspect="1"/>
-            </p:cNvPicPr>
-            <p:nvPr/>
-          </p:nvPicPr>
-          <p:blipFill rotWithShape="1">
-            <a:blip r:embed="rId2">
-              <a:extLst>
-                <a:ext uri="{28A0092B-C50C-407E-A947-70E740481C1C}">
-                  <a14:useLocalDpi xmlns:a14="http://schemas.microsoft.com/office/drawing/2010/main" val="0"/>
-                </a:ext>
-              </a:extLst>
-            </a:blip>
-            <a:srcRect l="14815" t="4921" r="20007" b="9027"/>
-            <a:stretch/>
-          </p:blipFill>
-          <p:spPr>
-            <a:xfrm>
-              <a:off x="6276976" y="1597025"/>
-              <a:ext cx="1676400" cy="1589036"/>
-            </a:xfrm>
-            <a:prstGeom prst="rect">
-              <a:avLst/>
-            </a:prstGeom>
-          </p:spPr>
-        </p:pic>
-        <p:pic>
-          <p:nvPicPr>
-            <p:cNvPr id="45" name="Picture 44" descr="A spoonful of salt&#10;&#10;Description automatically generated">
-              <a:extLst>
-                <a:ext uri="{FF2B5EF4-FFF2-40B4-BE49-F238E27FC236}">
-                  <a16:creationId xmlns:a16="http://schemas.microsoft.com/office/drawing/2014/main" id="{CC9B1E1B-9CFA-2243-C57A-0001EC2E4074}"/>
-                </a:ext>
-              </a:extLst>
-            </p:cNvPr>
-            <p:cNvPicPr>
-              <a:picLocks noChangeAspect="1"/>
-            </p:cNvPicPr>
-            <p:nvPr/>
-          </p:nvPicPr>
-          <p:blipFill rotWithShape="1">
-            <a:blip r:embed="rId2">
-              <a:extLst>
-                <a:ext uri="{28A0092B-C50C-407E-A947-70E740481C1C}">
-                  <a14:useLocalDpi xmlns:a14="http://schemas.microsoft.com/office/drawing/2010/main" val="0"/>
-                </a:ext>
-              </a:extLst>
-            </a:blip>
-            <a:srcRect l="14815" t="4921" r="20007" b="9027"/>
-            <a:stretch/>
-          </p:blipFill>
-          <p:spPr>
-            <a:xfrm>
-              <a:off x="7972427" y="1597025"/>
-              <a:ext cx="1676400" cy="1589036"/>
-            </a:xfrm>
-            <a:prstGeom prst="rect">
-              <a:avLst/>
-            </a:prstGeom>
-          </p:spPr>
-        </p:pic>
-        <p:pic>
-          <p:nvPicPr>
-            <p:cNvPr id="46" name="Picture 45" descr="A person holding a spoon in a glass cup&#10;&#10;Description automatically generated">
-              <a:extLst>
-                <a:ext uri="{FF2B5EF4-FFF2-40B4-BE49-F238E27FC236}">
-                  <a16:creationId xmlns:a16="http://schemas.microsoft.com/office/drawing/2014/main" id="{3BC802CB-578F-C0A6-89A6-75E4DA2E3309}"/>
-                </a:ext>
-              </a:extLst>
-            </p:cNvPr>
-            <p:cNvPicPr>
-              <a:picLocks noChangeAspect="1"/>
-            </p:cNvPicPr>
-            <p:nvPr/>
-          </p:nvPicPr>
-          <p:blipFill rotWithShape="1">
-            <a:blip r:embed="rId3">
-              <a:extLst>
-                <a:ext uri="{28A0092B-C50C-407E-A947-70E740481C1C}">
-                  <a14:useLocalDpi xmlns:a14="http://schemas.microsoft.com/office/drawing/2010/main" val="0"/>
-                </a:ext>
-              </a:extLst>
-            </a:blip>
-            <a:srcRect l="23677" t="9884" r="23865" b="11124"/>
-            <a:stretch/>
-          </p:blipFill>
-          <p:spPr>
-            <a:xfrm>
-              <a:off x="4578609" y="3186061"/>
-              <a:ext cx="1698367" cy="1704976"/>
-            </a:xfrm>
-            <a:prstGeom prst="rect">
-              <a:avLst/>
-            </a:prstGeom>
-          </p:spPr>
-        </p:pic>
-        <p:pic>
-          <p:nvPicPr>
-            <p:cNvPr id="47" name="Picture 46" descr="A person holding a spoon in a glass cup&#10;&#10;Description automatically generated">
-              <a:extLst>
-                <a:ext uri="{FF2B5EF4-FFF2-40B4-BE49-F238E27FC236}">
-                  <a16:creationId xmlns:a16="http://schemas.microsoft.com/office/drawing/2014/main" id="{36F40EE5-59BE-6BB5-7B73-4F92C3C29E11}"/>
-                </a:ext>
-              </a:extLst>
-            </p:cNvPr>
-            <p:cNvPicPr>
-              <a:picLocks noChangeAspect="1"/>
-            </p:cNvPicPr>
-            <p:nvPr/>
-          </p:nvPicPr>
-          <p:blipFill rotWithShape="1">
-            <a:blip r:embed="rId3">
-              <a:extLst>
-                <a:ext uri="{28A0092B-C50C-407E-A947-70E740481C1C}">
-                  <a14:useLocalDpi xmlns:a14="http://schemas.microsoft.com/office/drawing/2010/main" val="0"/>
-                </a:ext>
-              </a:extLst>
-            </a:blip>
-            <a:srcRect l="23677" t="9884" r="23865" b="11124"/>
-            <a:stretch/>
-          </p:blipFill>
-          <p:spPr>
-            <a:xfrm>
-              <a:off x="4578609" y="4891037"/>
-              <a:ext cx="1698367" cy="1704976"/>
-            </a:xfrm>
-            <a:prstGeom prst="rect">
-              <a:avLst/>
-            </a:prstGeom>
-          </p:spPr>
-        </p:pic>
-        <p:sp>
-          <p:nvSpPr>
-            <p:cNvPr id="48" name="&quot;Not Allowed&quot; Symbol 47">
-              <a:extLst>
-                <a:ext uri="{FF2B5EF4-FFF2-40B4-BE49-F238E27FC236}">
-                  <a16:creationId xmlns:a16="http://schemas.microsoft.com/office/drawing/2014/main" id="{D12AF4CB-CE0E-57D1-F3B3-282843514242}"/>
-                </a:ext>
-              </a:extLst>
-            </p:cNvPr>
-            <p:cNvSpPr/>
-            <p:nvPr/>
-          </p:nvSpPr>
-          <p:spPr>
-            <a:xfrm>
-              <a:off x="8181975" y="1825625"/>
-              <a:ext cx="1295400" cy="1250950"/>
-            </a:xfrm>
-            <a:prstGeom prst="noSmoking">
-              <a:avLst/>
-            </a:prstGeom>
-            <a:solidFill>
-              <a:srgbClr val="FF0000"/>
-            </a:solidFill>
-            <a:ln>
-              <a:solidFill>
-                <a:schemeClr val="tx1"/>
-              </a:solidFill>
-            </a:ln>
-          </p:spPr>
-          <p:style>
-            <a:lnRef idx="2">
-              <a:schemeClr val="accent1">
-                <a:shade val="15000"/>
-              </a:schemeClr>
-            </a:lnRef>
-            <a:fillRef idx="1">
-              <a:schemeClr val="accent1"/>
-            </a:fillRef>
-            <a:effectRef idx="0">
-              <a:schemeClr val="accent1"/>
-            </a:effectRef>
-            <a:fontRef idx="minor">
-              <a:schemeClr val="lt1"/>
-            </a:fontRef>
-          </p:style>
-          <p:txBody>
-            <a:bodyPr rtlCol="0" anchor="ctr"/>
-            <a:lstStyle/>
-            <a:p>
-              <a:pPr algn="ctr"/>
-              <a:endParaRPr lang="en-GB">
-                <a:solidFill>
-                  <a:schemeClr val="tx1"/>
-                </a:solidFill>
-              </a:endParaRPr>
-            </a:p>
-          </p:txBody>
-        </p:sp>
-        <p:sp>
-          <p:nvSpPr>
-            <p:cNvPr id="49" name="&quot;Not Allowed&quot; Symbol 48">
-              <a:extLst>
-                <a:ext uri="{FF2B5EF4-FFF2-40B4-BE49-F238E27FC236}">
-                  <a16:creationId xmlns:a16="http://schemas.microsoft.com/office/drawing/2014/main" id="{5626F92B-516A-6F08-0F3C-42FE516B5D0D}"/>
-                </a:ext>
-              </a:extLst>
-            </p:cNvPr>
-            <p:cNvSpPr/>
-            <p:nvPr/>
-          </p:nvSpPr>
-          <p:spPr>
-            <a:xfrm>
-              <a:off x="4800600" y="5135538"/>
-              <a:ext cx="1295400" cy="1250950"/>
-            </a:xfrm>
-            <a:prstGeom prst="noSmoking">
-              <a:avLst/>
-            </a:prstGeom>
-            <a:solidFill>
-              <a:srgbClr val="FF0000"/>
-            </a:solidFill>
-            <a:ln>
-              <a:solidFill>
-                <a:schemeClr val="tx1"/>
-              </a:solidFill>
-            </a:ln>
-          </p:spPr>
-          <p:style>
-            <a:lnRef idx="2">
-              <a:schemeClr val="accent1">
-                <a:shade val="15000"/>
-              </a:schemeClr>
-            </a:lnRef>
-            <a:fillRef idx="1">
-              <a:schemeClr val="accent1"/>
-            </a:fillRef>
-            <a:effectRef idx="0">
-              <a:schemeClr val="accent1"/>
-            </a:effectRef>
-            <a:fontRef idx="minor">
-              <a:schemeClr val="lt1"/>
-            </a:fontRef>
-          </p:style>
-          <p:txBody>
-            <a:bodyPr rtlCol="0" anchor="ctr"/>
-            <a:lstStyle/>
-            <a:p>
-              <a:pPr algn="ctr"/>
-              <a:endParaRPr lang="en-GB">
-                <a:solidFill>
-                  <a:schemeClr val="tx1"/>
-                </a:solidFill>
-              </a:endParaRPr>
-            </a:p>
-          </p:txBody>
-        </p:sp>
-        <p:sp>
-          <p:nvSpPr>
-            <p:cNvPr id="50" name="TextBox 49">
-              <a:extLst>
-                <a:ext uri="{FF2B5EF4-FFF2-40B4-BE49-F238E27FC236}">
-                  <a16:creationId xmlns:a16="http://schemas.microsoft.com/office/drawing/2014/main" id="{128DE7FE-C529-A204-3055-440E5F992B6B}"/>
-                </a:ext>
-              </a:extLst>
-            </p:cNvPr>
-            <p:cNvSpPr txBox="1"/>
-            <p:nvPr/>
-          </p:nvSpPr>
-          <p:spPr>
-            <a:xfrm>
-              <a:off x="6715125" y="3876675"/>
-              <a:ext cx="798552" cy="369332"/>
-            </a:xfrm>
-            <a:prstGeom prst="rect">
-              <a:avLst/>
-            </a:prstGeom>
-            <a:noFill/>
-          </p:spPr>
-          <p:txBody>
-            <a:bodyPr wrap="none" rtlCol="0">
-              <a:spAutoFit/>
-            </a:bodyPr>
-            <a:lstStyle/>
-            <a:p>
-              <a:r>
-                <a:rPr lang="en-GB" dirty="0"/>
-                <a:t>Sweet</a:t>
-              </a:r>
-            </a:p>
-          </p:txBody>
-        </p:sp>
-        <p:sp>
-          <p:nvSpPr>
-            <p:cNvPr id="51" name="TextBox 50">
-              <a:extLst>
-                <a:ext uri="{FF2B5EF4-FFF2-40B4-BE49-F238E27FC236}">
-                  <a16:creationId xmlns:a16="http://schemas.microsoft.com/office/drawing/2014/main" id="{9C315E20-CE0E-84E7-23EE-9EA74CE4DD9B}"/>
-                </a:ext>
-              </a:extLst>
-            </p:cNvPr>
-            <p:cNvSpPr txBox="1"/>
-            <p:nvPr/>
-          </p:nvSpPr>
-          <p:spPr>
-            <a:xfrm>
-              <a:off x="8218452" y="3876675"/>
-              <a:ext cx="1210524" cy="369332"/>
-            </a:xfrm>
-            <a:prstGeom prst="rect">
-              <a:avLst/>
-            </a:prstGeom>
-            <a:noFill/>
-          </p:spPr>
-          <p:txBody>
-            <a:bodyPr wrap="none" rtlCol="0">
-              <a:spAutoFit/>
-            </a:bodyPr>
-            <a:lstStyle/>
-            <a:p>
-              <a:r>
-                <a:rPr lang="en-GB" dirty="0"/>
-                <a:t>Not Sweet</a:t>
-              </a:r>
-            </a:p>
-          </p:txBody>
-        </p:sp>
-        <p:sp>
-          <p:nvSpPr>
-            <p:cNvPr id="52" name="TextBox 51">
-              <a:extLst>
-                <a:ext uri="{FF2B5EF4-FFF2-40B4-BE49-F238E27FC236}">
-                  <a16:creationId xmlns:a16="http://schemas.microsoft.com/office/drawing/2014/main" id="{E84274C3-8E2B-920C-E4DF-153A56E74A11}"/>
-                </a:ext>
-              </a:extLst>
-            </p:cNvPr>
-            <p:cNvSpPr txBox="1"/>
-            <p:nvPr/>
-          </p:nvSpPr>
-          <p:spPr>
-            <a:xfrm>
-              <a:off x="6509135" y="5578390"/>
-              <a:ext cx="1210524" cy="369332"/>
-            </a:xfrm>
-            <a:prstGeom prst="rect">
-              <a:avLst/>
-            </a:prstGeom>
-            <a:noFill/>
-          </p:spPr>
-          <p:txBody>
-            <a:bodyPr wrap="none" rtlCol="0">
-              <a:spAutoFit/>
-            </a:bodyPr>
-            <a:lstStyle/>
-            <a:p>
-              <a:r>
-                <a:rPr lang="en-GB" dirty="0"/>
-                <a:t>Not Sweet</a:t>
-              </a:r>
-            </a:p>
-          </p:txBody>
-        </p:sp>
-        <p:sp>
-          <p:nvSpPr>
-            <p:cNvPr id="53" name="TextBox 52">
-              <a:extLst>
-                <a:ext uri="{FF2B5EF4-FFF2-40B4-BE49-F238E27FC236}">
-                  <a16:creationId xmlns:a16="http://schemas.microsoft.com/office/drawing/2014/main" id="{353CAD47-0FA7-AF7B-321F-136E5AB504E6}"/>
-                </a:ext>
-              </a:extLst>
-            </p:cNvPr>
-            <p:cNvSpPr txBox="1"/>
-            <p:nvPr/>
-          </p:nvSpPr>
-          <p:spPr>
-            <a:xfrm>
-              <a:off x="8204587" y="5576347"/>
-              <a:ext cx="1210524" cy="369332"/>
-            </a:xfrm>
-            <a:prstGeom prst="rect">
-              <a:avLst/>
-            </a:prstGeom>
-            <a:noFill/>
-          </p:spPr>
-          <p:txBody>
-            <a:bodyPr wrap="none" rtlCol="0">
-              <a:spAutoFit/>
-            </a:bodyPr>
-            <a:lstStyle/>
-            <a:p>
-              <a:r>
-                <a:rPr lang="en-GB" dirty="0"/>
-                <a:t>Not Sweet</a:t>
-              </a:r>
-            </a:p>
-          </p:txBody>
-        </p:sp>
-        <p:cxnSp>
-          <p:nvCxnSpPr>
-            <p:cNvPr id="54" name="Straight Connector 53">
-              <a:extLst>
-                <a:ext uri="{FF2B5EF4-FFF2-40B4-BE49-F238E27FC236}">
-                  <a16:creationId xmlns:a16="http://schemas.microsoft.com/office/drawing/2014/main" id="{D97AC2A4-DD25-237B-A108-A2F4EDA94B7A}"/>
-                </a:ext>
-              </a:extLst>
-            </p:cNvPr>
-            <p:cNvCxnSpPr>
-              <a:cxnSpLocks/>
-            </p:cNvCxnSpPr>
-            <p:nvPr/>
-          </p:nvCxnSpPr>
-          <p:spPr>
-            <a:xfrm>
-              <a:off x="7972427" y="1597025"/>
-              <a:ext cx="0" cy="4998988"/>
-            </a:xfrm>
-            <a:prstGeom prst="line">
-              <a:avLst/>
-            </a:prstGeom>
-            <a:ln>
-              <a:solidFill>
-                <a:schemeClr val="tx1"/>
-              </a:solidFill>
-            </a:ln>
-          </p:spPr>
-          <p:style>
-            <a:lnRef idx="2">
-              <a:schemeClr val="accent1"/>
-            </a:lnRef>
-            <a:fillRef idx="0">
-              <a:schemeClr val="accent1"/>
-            </a:fillRef>
-            <a:effectRef idx="1">
-              <a:schemeClr val="accent1"/>
-            </a:effectRef>
-            <a:fontRef idx="minor">
-              <a:schemeClr val="tx1"/>
-            </a:fontRef>
-          </p:style>
-        </p:cxnSp>
-        <p:cxnSp>
-          <p:nvCxnSpPr>
-            <p:cNvPr id="55" name="Straight Connector 54">
-              <a:extLst>
-                <a:ext uri="{FF2B5EF4-FFF2-40B4-BE49-F238E27FC236}">
-                  <a16:creationId xmlns:a16="http://schemas.microsoft.com/office/drawing/2014/main" id="{BEFE027F-5960-40FC-3657-C12975B55665}"/>
-                </a:ext>
-              </a:extLst>
-            </p:cNvPr>
-            <p:cNvCxnSpPr>
-              <a:cxnSpLocks/>
-            </p:cNvCxnSpPr>
-            <p:nvPr/>
-          </p:nvCxnSpPr>
-          <p:spPr>
-            <a:xfrm>
-              <a:off x="4578609" y="4891037"/>
-              <a:ext cx="5070218" cy="0"/>
-            </a:xfrm>
-            <a:prstGeom prst="line">
-              <a:avLst/>
-            </a:prstGeom>
-            <a:ln>
-              <a:solidFill>
-                <a:schemeClr val="tx1"/>
-              </a:solidFill>
-            </a:ln>
-          </p:spPr>
-          <p:style>
-            <a:lnRef idx="2">
-              <a:schemeClr val="accent1"/>
-            </a:lnRef>
-            <a:fillRef idx="0">
-              <a:schemeClr val="accent1"/>
-            </a:fillRef>
-            <a:effectRef idx="1">
-              <a:schemeClr val="accent1"/>
-            </a:effectRef>
-            <a:fontRef idx="minor">
-              <a:schemeClr val="tx1"/>
-            </a:fontRef>
-          </p:style>
-        </p:cxnSp>
-        <p:cxnSp>
-          <p:nvCxnSpPr>
-            <p:cNvPr id="56" name="Straight Connector 55">
-              <a:extLst>
-                <a:ext uri="{FF2B5EF4-FFF2-40B4-BE49-F238E27FC236}">
-                  <a16:creationId xmlns:a16="http://schemas.microsoft.com/office/drawing/2014/main" id="{F45C69D2-6780-823A-98D7-6BDC07BBCCF7}"/>
-                </a:ext>
-              </a:extLst>
-            </p:cNvPr>
-            <p:cNvCxnSpPr>
-              <a:cxnSpLocks/>
-            </p:cNvCxnSpPr>
-            <p:nvPr/>
-          </p:nvCxnSpPr>
-          <p:spPr>
-            <a:xfrm>
-              <a:off x="4578609" y="3186061"/>
-              <a:ext cx="5070218" cy="0"/>
-            </a:xfrm>
-            <a:prstGeom prst="line">
-              <a:avLst/>
-            </a:prstGeom>
-            <a:ln>
-              <a:solidFill>
-                <a:schemeClr val="tx1"/>
-              </a:solidFill>
-            </a:ln>
-          </p:spPr>
-          <p:style>
-            <a:lnRef idx="2">
-              <a:schemeClr val="accent1"/>
-            </a:lnRef>
-            <a:fillRef idx="0">
-              <a:schemeClr val="accent1"/>
-            </a:fillRef>
-            <a:effectRef idx="1">
-              <a:schemeClr val="accent1"/>
-            </a:effectRef>
-            <a:fontRef idx="minor">
-              <a:schemeClr val="tx1"/>
-            </a:fontRef>
-          </p:style>
-        </p:cxnSp>
-        <p:cxnSp>
-          <p:nvCxnSpPr>
-            <p:cNvPr id="57" name="Straight Connector 56">
-              <a:extLst>
-                <a:ext uri="{FF2B5EF4-FFF2-40B4-BE49-F238E27FC236}">
-                  <a16:creationId xmlns:a16="http://schemas.microsoft.com/office/drawing/2014/main" id="{83A6CA2E-7B0F-DE82-4F5B-9DA44F324C93}"/>
-                </a:ext>
-              </a:extLst>
-            </p:cNvPr>
-            <p:cNvCxnSpPr>
-              <a:cxnSpLocks/>
-            </p:cNvCxnSpPr>
-            <p:nvPr/>
-          </p:nvCxnSpPr>
-          <p:spPr>
-            <a:xfrm>
-              <a:off x="6276978" y="1597025"/>
-              <a:ext cx="0" cy="4998988"/>
-            </a:xfrm>
-            <a:prstGeom prst="line">
-              <a:avLst/>
-            </a:prstGeom>
-            <a:ln>
-              <a:solidFill>
-                <a:schemeClr val="tx1"/>
-              </a:solidFill>
-            </a:ln>
-          </p:spPr>
-          <p:style>
-            <a:lnRef idx="2">
-              <a:schemeClr val="accent1"/>
-            </a:lnRef>
-            <a:fillRef idx="0">
-              <a:schemeClr val="accent1"/>
-            </a:fillRef>
-            <a:effectRef idx="1">
-              <a:schemeClr val="accent1"/>
-            </a:effectRef>
-            <a:fontRef idx="minor">
-              <a:schemeClr val="tx1"/>
-            </a:fontRef>
-          </p:style>
-        </p:cxnSp>
-      </p:grpSp>
-    </p:spTree>
-    <p:extLst>
-      <p:ext uri="{BB962C8B-B14F-4D97-AF65-F5344CB8AC3E}">
-        <p14:creationId xmlns:p14="http://schemas.microsoft.com/office/powerpoint/2010/main" val="1032179350"/>
-      </p:ext>
-    </p:extLst>
-  </p:cSld>
-  <p:clrMapOvr>
-    <a:masterClrMapping/>
-  </p:clrMapOvr>
-  <mc:AlternateContent xmlns:mc="http://schemas.openxmlformats.org/markup-compatibility/2006" xmlns:p14="http://schemas.microsoft.com/office/powerpoint/2010/main">
-    <mc:Choice Requires="p14">
-      <p:transition spd="med" p14:dur="700">
-        <p:fade/>
-      </p:transition>
-    </mc:Choice>
-    <mc:Fallback xmlns="">
-      <p:transition spd="med">
-        <p:fade/>
-      </p:transition>
-    </mc:Fallback>
-  </mc:AlternateContent>
-  <p:timing>
-    <p:tnLst>
-      <p:par>
-        <p:cTn id="1" dur="indefinite" restart="never" nodeType="tmRoot">
-          <p:childTnLst>
-            <p:seq concurrent="1" nextAc="seek">
-              <p:cTn id="2" dur="indefinite" nodeType="mainSeq">
-                <p:childTnLst>
                   <p:par>
-                    <p:cTn id="3" fill="hold">
+                    <p:cTn id="8" fill="hold">
                       <p:stCondLst>
                         <p:cond delay="indefinite"/>
-                        <p:cond evt="onBegin" delay="0">
-                          <p:tn val="2"/>
-                        </p:cond>
                       </p:stCondLst>
                       <p:childTnLst>
                         <p:par>
-                          <p:cTn id="4" fill="hold">
+                          <p:cTn id="9" fill="hold">
                             <p:stCondLst>
                               <p:cond delay="0"/>
                             </p:stCondLst>
                             <p:childTnLst>
                               <p:par>
-                                <p:cTn id="5" presetID="10" presetClass="entr" presetSubtype="0" fill="hold" nodeType="withEffect">
+                                <p:cTn id="10" presetID="10" presetClass="entr" presetSubtype="0" fill="hold" grpId="0" nodeType="clickEffect">
                                   <p:stCondLst>
                                     <p:cond delay="0"/>
                                   </p:stCondLst>
                                   <p:childTnLst>
                                     <p:set>
                                       <p:cBhvr>
-                                        <p:cTn id="6" dur="1" fill="hold">
+                                        <p:cTn id="11" dur="1" fill="hold">
                                           <p:stCondLst>
                                             <p:cond delay="0"/>
                                           </p:stCondLst>
                                         </p:cTn>
                                         <p:tgtEl>
-                                          <p:spTgt spid="43"/>
+                                          <p:spTgt spid="3">
+                                            <p:txEl>
+                                              <p:pRg st="1" end="1"/>
+                                            </p:txEl>
+                                          </p:spTgt>
                                         </p:tgtEl>
                                         <p:attrNameLst>
                                           <p:attrName>style.visibility</p:attrName>
@@ -11223,9 +10739,74 @@
                                     </p:set>
                                     <p:animEffect transition="in" filter="fade">
                                       <p:cBhvr>
-                                        <p:cTn id="7" dur="500"/>
+                                        <p:cTn id="12" dur="500"/>
                                         <p:tgtEl>
-                                          <p:spTgt spid="43"/>
+                                          <p:spTgt spid="3">
+                                            <p:txEl>
+                                              <p:pRg st="1" end="1"/>
+                                            </p:txEl>
+                                          </p:spTgt>
+                                        </p:tgtEl>
+                                      </p:cBhvr>
+                                    </p:animEffect>
+                                  </p:childTnLst>
+                                </p:cTn>
+                              </p:par>
+                            </p:childTnLst>
+                          </p:cTn>
+                        </p:par>
+                      </p:childTnLst>
+                    </p:cTn>
+                  </p:par>
+                  <p:par>
+                    <p:cTn id="13" fill="hold">
+                      <p:stCondLst>
+                        <p:cond delay="indefinite"/>
+                      </p:stCondLst>
+                      <p:childTnLst>
+                        <p:par>
+                          <p:cTn id="14" fill="hold">
+                            <p:stCondLst>
+                              <p:cond delay="0"/>
+                            </p:stCondLst>
+                            <p:childTnLst>
+                              <p:par>
+                                <p:cTn id="15" presetID="10" presetClass="entr" presetSubtype="0" fill="hold" grpId="0" nodeType="clickEffect">
+                                  <p:stCondLst>
+                                    <p:cond delay="0"/>
+                                  </p:stCondLst>
+                                  <p:childTnLst>
+                                    <p:set>
+                                      <p:cBhvr>
+                                        <p:cTn id="16" dur="1" fill="hold">
+                                          <p:stCondLst>
+                                            <p:cond delay="0"/>
+                                          </p:stCondLst>
+                                        </p:cTn>
+                                        <p:tgtEl>
+                                          <p:spTgt spid="3">
+                                            <p:txEl>
+                                              <p:pRg st="2" end="2"/>
+                                            </p:txEl>
+                                          </p:spTgt>
+                                        </p:tgtEl>
+                                        <p:attrNameLst>
+                                          <p:attrName>style.visibility</p:attrName>
+                                        </p:attrNameLst>
+                                      </p:cBhvr>
+                                      <p:to>
+                                        <p:strVal val="visible"/>
+                                      </p:to>
+                                    </p:set>
+                                    <p:animEffect transition="in" filter="fade">
+                                      <p:cBhvr>
+                                        <p:cTn id="17" dur="500"/>
+                                        <p:tgtEl>
+                                          <p:spTgt spid="3">
+                                            <p:txEl>
+                                              <p:pRg st="2" end="2"/>
+                                            </p:txEl>
+                                          </p:spTgt>
                                         </p:tgtEl>
                                       </p:cBhvr>
                                     </p:animEffect>
@@ -11259,6 +10840,9 @@
         </p:cTn>
       </p:par>
     </p:tnLst>
+    <p:bldLst>
+      <p:bldP spid="3" grpId="0" uiExpand="1" build="p"/>
+    </p:bldLst>
   </p:timing>
 </p:sld>
 </file>
@@ -11349,7 +10933,7 @@
           <a:p>
             <a:r>
               <a:rPr lang="en-GB" dirty="0"/>
-              <a:t>Different species can east more or less crops</a:t>
+              <a:t>Different species can eat more or less crops</a:t>
             </a:r>
           </a:p>
         </p:txBody>
@@ -11803,13 +11387,7 @@
   <p:cSld>
     <p:spTree>
       <p:nvGrpSpPr>
-        <p:cNvPr id="1" name="">
-          <a:extLst>
-            <a:ext uri="{FF2B5EF4-FFF2-40B4-BE49-F238E27FC236}">
-              <a16:creationId xmlns:a16="http://schemas.microsoft.com/office/drawing/2014/main" id="{5806D716-38B6-5EE9-C1A4-94F72EAFB44B}"/>
-            </a:ext>
-          </a:extLst>
-        </p:cNvPr>
+        <p:cNvPr id="1" name=""/>
         <p:cNvGrpSpPr/>
         <p:nvPr/>
       </p:nvGrpSpPr>
@@ -11821,12 +11399,49 @@
           <a:chExt cx="0" cy="0"/>
         </a:xfrm>
       </p:grpSpPr>
+      <p:pic>
+        <p:nvPicPr>
+          <p:cNvPr id="7" name="Picture Placeholder 9" descr="A graph with different colored lines&#10;&#10;Description automatically generated">
+            <a:extLst>
+              <a:ext uri="{FF2B5EF4-FFF2-40B4-BE49-F238E27FC236}">
+                <a16:creationId xmlns:a16="http://schemas.microsoft.com/office/drawing/2014/main" id="{8646109C-8462-2BF6-1A1A-82AF381A4B3E}"/>
+              </a:ext>
+            </a:extLst>
+          </p:cNvPr>
+          <p:cNvPicPr>
+            <a:picLocks noChangeAspect="1"/>
+          </p:cNvPicPr>
+          <p:nvPr/>
+        </p:nvPicPr>
+        <p:blipFill>
+          <a:blip r:embed="rId2">
+            <a:extLst>
+              <a:ext uri="{28A0092B-C50C-407E-A947-70E740481C1C}">
+                <a14:useLocalDpi xmlns:a14="http://schemas.microsoft.com/office/drawing/2010/main" val="0"/>
+              </a:ext>
+            </a:extLst>
+          </a:blip>
+          <a:srcRect t="691" b="691"/>
+          <a:stretch>
+            <a:fillRect/>
+          </a:stretch>
+        </p:blipFill>
+        <p:spPr>
+          <a:xfrm>
+            <a:off x="6359524" y="0"/>
+            <a:ext cx="5832475" cy="6858000"/>
+          </a:xfrm>
+          <a:prstGeom prst="rect">
+            <a:avLst/>
+          </a:prstGeom>
+        </p:spPr>
+      </p:pic>
       <p:sp>
         <p:nvSpPr>
           <p:cNvPr id="2" name="Title 1">
             <a:extLst>
               <a:ext uri="{FF2B5EF4-FFF2-40B4-BE49-F238E27FC236}">
-                <a16:creationId xmlns:a16="http://schemas.microsoft.com/office/drawing/2014/main" id="{59F7E4CB-CCE1-3BEF-ABE3-5E2AB9A7FB96}"/>
+                <a16:creationId xmlns:a16="http://schemas.microsoft.com/office/drawing/2014/main" id="{EC87494F-DC84-33F2-34D6-EE7E80CD7018}"/>
               </a:ext>
             </a:extLst>
           </p:cNvPr>
@@ -11837,1360 +11452,371 @@
             <p:ph type="title"/>
           </p:nvPr>
         </p:nvSpPr>
-        <p:spPr>
-          <a:xfrm>
-            <a:off x="0" y="0"/>
-            <a:ext cx="12192000" cy="1325563"/>
-          </a:xfrm>
-        </p:spPr>
+        <p:spPr/>
         <p:txBody>
-          <a:bodyPr>
-            <a:normAutofit/>
-          </a:bodyPr>
+          <a:bodyPr/>
           <a:lstStyle/>
           <a:p>
-            <a:pPr algn="ctr"/>
             <a:r>
-              <a:rPr lang="en-GB" sz="5400" dirty="0">
-                <a:latin typeface="Bahnschrift Light" panose="020B0502040204020203" pitchFamily="34" charset="0"/>
+              <a:rPr lang="en-GB" dirty="0">
+                <a:latin typeface="Courier New" panose="02070309020205020404" pitchFamily="49" charset="0"/>
+                <a:cs typeface="Courier New" panose="02070309020205020404" pitchFamily="49" charset="0"/>
               </a:rPr>
-              <a:t>What is </a:t>
+              <a:t>species * density</a:t>
             </a:r>
-            <a:r>
-              <a:rPr lang="en-GB" sz="5400" i="1" dirty="0">
-                <a:latin typeface="Bahnschrift Light" panose="020B0502040204020203" pitchFamily="34" charset="0"/>
-              </a:rPr>
-              <a:t>our</a:t>
-            </a:r>
-            <a:r>
-              <a:rPr lang="en-GB" sz="5400" dirty="0">
-                <a:latin typeface="Bahnschrift Light" panose="020B0502040204020203" pitchFamily="34" charset="0"/>
-              </a:rPr>
-              <a:t> interaction?</a:t>
-            </a:r>
-            <a:endParaRPr lang="en-GB" sz="5400" dirty="0">
-              <a:latin typeface="Courier New" panose="02070309020205020404" pitchFamily="49" charset="0"/>
-              <a:cs typeface="Courier New" panose="02070309020205020404" pitchFamily="49" charset="0"/>
-            </a:endParaRPr>
           </a:p>
         </p:txBody>
       </p:sp>
-      <p:graphicFrame>
-        <p:nvGraphicFramePr>
-          <p:cNvPr id="3" name="Table 2">
+      <p:sp>
+        <p:nvSpPr>
+          <p:cNvPr id="3" name="Content Placeholder 2">
             <a:extLst>
               <a:ext uri="{FF2B5EF4-FFF2-40B4-BE49-F238E27FC236}">
-                <a16:creationId xmlns:a16="http://schemas.microsoft.com/office/drawing/2014/main" id="{BF1FA362-F3AD-BC80-DA3E-7D2AE9BCB365}"/>
+                <a16:creationId xmlns:a16="http://schemas.microsoft.com/office/drawing/2014/main" id="{474D63BF-94B1-3832-19A6-40532D309148}"/>
               </a:ext>
             </a:extLst>
           </p:cNvPr>
-          <p:cNvGraphicFramePr>
-            <a:graphicFrameLocks noGrp="1"/>
-          </p:cNvGraphicFramePr>
+          <p:cNvSpPr>
+            <a:spLocks noGrp="1"/>
+          </p:cNvSpPr>
           <p:nvPr>
-            <p:extLst>
-              <p:ext uri="{D42A27DB-BD31-4B8C-83A1-F6EECF244321}">
-                <p14:modId xmlns:p14="http://schemas.microsoft.com/office/powerpoint/2010/main" val="3713208841"/>
-              </p:ext>
-            </p:extLst>
+            <p:ph idx="1"/>
           </p:nvPr>
-        </p:nvGraphicFramePr>
-        <p:xfrm>
-          <a:off x="2280356" y="1537547"/>
-          <a:ext cx="7631288" cy="2225040"/>
-        </p:xfrm>
-        <a:graphic>
-          <a:graphicData uri="http://schemas.openxmlformats.org/drawingml/2006/table">
-            <a:tbl>
-              <a:tblPr firstRow="1" bandRow="1">
-                <a:tableStyleId>{5C22544A-7EE6-4342-B048-85BDC9FD1C3A}</a:tableStyleId>
-              </a:tblPr>
-              <a:tblGrid>
-                <a:gridCol w="1090184">
-                  <a:extLst>
-                    <a:ext uri="{9D8B030D-6E8A-4147-A177-3AD203B41FA5}">
-                      <a16:colId xmlns:a16="http://schemas.microsoft.com/office/drawing/2014/main" val="1160138373"/>
-                    </a:ext>
-                  </a:extLst>
-                </a:gridCol>
-                <a:gridCol w="1090184">
-                  <a:extLst>
-                    <a:ext uri="{9D8B030D-6E8A-4147-A177-3AD203B41FA5}">
-                      <a16:colId xmlns:a16="http://schemas.microsoft.com/office/drawing/2014/main" val="3384200162"/>
-                    </a:ext>
-                  </a:extLst>
-                </a:gridCol>
-                <a:gridCol w="1090184">
-                  <a:extLst>
-                    <a:ext uri="{9D8B030D-6E8A-4147-A177-3AD203B41FA5}">
-                      <a16:colId xmlns:a16="http://schemas.microsoft.com/office/drawing/2014/main" val="2488011330"/>
-                    </a:ext>
-                  </a:extLst>
-                </a:gridCol>
-                <a:gridCol w="1090184">
-                  <a:extLst>
-                    <a:ext uri="{9D8B030D-6E8A-4147-A177-3AD203B41FA5}">
-                      <a16:colId xmlns:a16="http://schemas.microsoft.com/office/drawing/2014/main" val="4086487555"/>
-                    </a:ext>
-                  </a:extLst>
-                </a:gridCol>
-                <a:gridCol w="1090184">
-                  <a:extLst>
-                    <a:ext uri="{9D8B030D-6E8A-4147-A177-3AD203B41FA5}">
-                      <a16:colId xmlns:a16="http://schemas.microsoft.com/office/drawing/2014/main" val="3776727704"/>
-                    </a:ext>
-                  </a:extLst>
-                </a:gridCol>
-                <a:gridCol w="1090184">
-                  <a:extLst>
-                    <a:ext uri="{9D8B030D-6E8A-4147-A177-3AD203B41FA5}">
-                      <a16:colId xmlns:a16="http://schemas.microsoft.com/office/drawing/2014/main" val="224713647"/>
-                    </a:ext>
-                  </a:extLst>
-                </a:gridCol>
-                <a:gridCol w="1090184">
-                  <a:extLst>
-                    <a:ext uri="{9D8B030D-6E8A-4147-A177-3AD203B41FA5}">
-                      <a16:colId xmlns:a16="http://schemas.microsoft.com/office/drawing/2014/main" val="377761171"/>
-                    </a:ext>
-                  </a:extLst>
-                </a:gridCol>
-              </a:tblGrid>
-              <a:tr h="370840">
-                <a:tc>
-                  <a:txBody>
-                    <a:bodyPr/>
-                    <a:lstStyle/>
-                    <a:p>
-                      <a:endParaRPr lang="en-GB"/>
-                    </a:p>
-                  </a:txBody>
-                  <a:tcPr/>
-                </a:tc>
-                <a:tc gridSpan="6">
-                  <a:txBody>
-                    <a:bodyPr/>
-                    <a:lstStyle/>
-                    <a:p>
-                      <a:pPr algn="ctr"/>
-                      <a:r>
-                        <a:rPr lang="en-GB" dirty="0"/>
-                        <a:t>Spectrum of density (continuous)</a:t>
-                      </a:r>
-                    </a:p>
-                  </a:txBody>
-                  <a:tcPr/>
-                </a:tc>
-                <a:tc hMerge="1">
-                  <a:txBody>
-                    <a:bodyPr/>
-                    <a:lstStyle/>
-                    <a:p>
-                      <a:endParaRPr lang="en-GB" dirty="0"/>
-                    </a:p>
-                  </a:txBody>
-                  <a:tcPr/>
-                </a:tc>
-                <a:tc hMerge="1">
-                  <a:txBody>
-                    <a:bodyPr/>
-                    <a:lstStyle/>
-                    <a:p>
-                      <a:endParaRPr lang="en-GB" dirty="0"/>
-                    </a:p>
-                  </a:txBody>
-                  <a:tcPr/>
-                </a:tc>
-                <a:tc hMerge="1">
-                  <a:txBody>
-                    <a:bodyPr/>
-                    <a:lstStyle/>
-                    <a:p>
-                      <a:endParaRPr lang="en-GB" dirty="0"/>
-                    </a:p>
-                  </a:txBody>
-                  <a:tcPr/>
-                </a:tc>
-                <a:tc hMerge="1">
-                  <a:txBody>
-                    <a:bodyPr/>
-                    <a:lstStyle/>
-                    <a:p>
-                      <a:endParaRPr lang="en-GB" dirty="0"/>
-                    </a:p>
-                  </a:txBody>
-                  <a:tcPr/>
-                </a:tc>
-                <a:tc hMerge="1">
-                  <a:txBody>
-                    <a:bodyPr/>
-                    <a:lstStyle/>
-                    <a:p>
-                      <a:endParaRPr lang="en-GB" dirty="0"/>
-                    </a:p>
-                  </a:txBody>
-                  <a:tcPr/>
-                </a:tc>
-                <a:extLst>
-                  <a:ext uri="{0D108BD9-81ED-4DB2-BD59-A6C34878D82A}">
-                    <a16:rowId xmlns:a16="http://schemas.microsoft.com/office/drawing/2014/main" val="359118433"/>
-                  </a:ext>
-                </a:extLst>
-              </a:tr>
-              <a:tr h="370840">
-                <a:tc>
-                  <a:txBody>
-                    <a:bodyPr/>
-                    <a:lstStyle/>
-                    <a:p>
-                      <a:endParaRPr lang="en-GB"/>
-                    </a:p>
-                  </a:txBody>
-                  <a:tcPr/>
-                </a:tc>
-                <a:tc>
-                  <a:txBody>
-                    <a:bodyPr/>
-                    <a:lstStyle/>
-                    <a:p>
-                      <a:r>
-                        <a:rPr lang="en-GB" dirty="0"/>
-                        <a:t>0</a:t>
-                      </a:r>
-                    </a:p>
-                  </a:txBody>
-                  <a:tcPr/>
-                </a:tc>
-                <a:tc>
-                  <a:txBody>
-                    <a:bodyPr/>
-                    <a:lstStyle/>
-                    <a:p>
-                      <a:r>
-                        <a:rPr lang="en-GB" dirty="0"/>
-                        <a:t>1</a:t>
-                      </a:r>
-                    </a:p>
-                  </a:txBody>
-                  <a:tcPr/>
-                </a:tc>
-                <a:tc>
-                  <a:txBody>
-                    <a:bodyPr/>
-                    <a:lstStyle/>
-                    <a:p>
-                      <a:r>
-                        <a:rPr lang="en-GB" dirty="0"/>
-                        <a:t>…</a:t>
-                      </a:r>
-                    </a:p>
-                  </a:txBody>
-                  <a:tcPr/>
-                </a:tc>
-                <a:tc>
-                  <a:txBody>
-                    <a:bodyPr/>
-                    <a:lstStyle/>
-                    <a:p>
-                      <a:r>
-                        <a:rPr lang="en-GB" dirty="0"/>
-                        <a:t>10</a:t>
-                      </a:r>
-                    </a:p>
-                  </a:txBody>
-                  <a:tcPr/>
-                </a:tc>
-                <a:tc>
-                  <a:txBody>
-                    <a:bodyPr/>
-                    <a:lstStyle/>
-                    <a:p>
-                      <a:r>
-                        <a:rPr lang="en-GB" dirty="0"/>
-                        <a:t>…</a:t>
-                      </a:r>
-                    </a:p>
-                  </a:txBody>
-                  <a:tcPr/>
-                </a:tc>
-                <a:tc>
-                  <a:txBody>
-                    <a:bodyPr/>
-                    <a:lstStyle/>
-                    <a:p>
-                      <a:r>
-                        <a:rPr lang="en-GB" dirty="0"/>
-                        <a:t>100</a:t>
-                      </a:r>
-                    </a:p>
-                  </a:txBody>
-                  <a:tcPr/>
-                </a:tc>
-                <a:extLst>
-                  <a:ext uri="{0D108BD9-81ED-4DB2-BD59-A6C34878D82A}">
-                    <a16:rowId xmlns:a16="http://schemas.microsoft.com/office/drawing/2014/main" val="2596269973"/>
-                  </a:ext>
-                </a:extLst>
-              </a:tr>
-              <a:tr h="370840">
-                <a:tc>
-                  <a:txBody>
-                    <a:bodyPr/>
-                    <a:lstStyle/>
-                    <a:p>
-                      <a:r>
-                        <a:rPr lang="en-GB" dirty="0"/>
-                        <a:t>Boar</a:t>
-                      </a:r>
-                    </a:p>
-                  </a:txBody>
-                  <a:tcPr/>
-                </a:tc>
-                <a:tc>
-                  <a:txBody>
-                    <a:bodyPr/>
-                    <a:lstStyle/>
-                    <a:p>
-                      <a:r>
-                        <a:rPr lang="en-GB" dirty="0"/>
-                        <a:t>None</a:t>
-                      </a:r>
-                    </a:p>
-                  </a:txBody>
-                  <a:tcPr/>
-                </a:tc>
-                <a:tc>
-                  <a:txBody>
-                    <a:bodyPr/>
-                    <a:lstStyle/>
-                    <a:p>
-                      <a:r>
-                        <a:rPr lang="en-GB" dirty="0"/>
-                        <a:t>Lots</a:t>
-                      </a:r>
-                    </a:p>
-                  </a:txBody>
-                  <a:tcPr/>
-                </a:tc>
-                <a:tc>
-                  <a:txBody>
-                    <a:bodyPr/>
-                    <a:lstStyle/>
-                    <a:p>
-                      <a:r>
-                        <a:rPr lang="en-GB" dirty="0"/>
-                        <a:t>…</a:t>
-                      </a:r>
-                    </a:p>
-                  </a:txBody>
-                  <a:tcPr/>
-                </a:tc>
-                <a:tc>
-                  <a:txBody>
-                    <a:bodyPr/>
-                    <a:lstStyle/>
-                    <a:p>
-                      <a:r>
-                        <a:rPr lang="en-GB" dirty="0"/>
-                        <a:t>Huge</a:t>
-                      </a:r>
-                    </a:p>
-                  </a:txBody>
-                  <a:tcPr/>
-                </a:tc>
-                <a:tc>
-                  <a:txBody>
-                    <a:bodyPr/>
-                    <a:lstStyle/>
-                    <a:p>
-                      <a:endParaRPr lang="en-GB"/>
-                    </a:p>
-                  </a:txBody>
-                  <a:tcPr/>
-                </a:tc>
-                <a:tc>
-                  <a:txBody>
-                    <a:bodyPr/>
-                    <a:lstStyle/>
-                    <a:p>
-                      <a:r>
-                        <a:rPr lang="en-GB" dirty="0"/>
-                        <a:t>Disaster</a:t>
-                      </a:r>
-                    </a:p>
-                  </a:txBody>
-                  <a:tcPr/>
-                </a:tc>
-                <a:extLst>
-                  <a:ext uri="{0D108BD9-81ED-4DB2-BD59-A6C34878D82A}">
-                    <a16:rowId xmlns:a16="http://schemas.microsoft.com/office/drawing/2014/main" val="714287132"/>
-                  </a:ext>
-                </a:extLst>
-              </a:tr>
-              <a:tr h="370840">
-                <a:tc>
-                  <a:txBody>
-                    <a:bodyPr/>
-                    <a:lstStyle/>
-                    <a:p>
-                      <a:r>
-                        <a:rPr lang="en-GB" dirty="0"/>
-                        <a:t>Deer</a:t>
-                      </a:r>
-                    </a:p>
-                  </a:txBody>
-                  <a:tcPr/>
-                </a:tc>
-                <a:tc>
-                  <a:txBody>
-                    <a:bodyPr/>
-                    <a:lstStyle/>
-                    <a:p>
-                      <a:r>
-                        <a:rPr lang="en-GB" dirty="0"/>
-                        <a:t>None</a:t>
-                      </a:r>
-                    </a:p>
-                  </a:txBody>
-                  <a:tcPr/>
-                </a:tc>
-                <a:tc>
-                  <a:txBody>
-                    <a:bodyPr/>
-                    <a:lstStyle/>
-                    <a:p>
-                      <a:r>
-                        <a:rPr lang="en-GB" dirty="0"/>
-                        <a:t>Medium</a:t>
-                      </a:r>
-                    </a:p>
-                  </a:txBody>
-                  <a:tcPr/>
-                </a:tc>
-                <a:tc>
-                  <a:txBody>
-                    <a:bodyPr/>
-                    <a:lstStyle/>
-                    <a:p>
-                      <a:r>
-                        <a:rPr lang="en-GB" dirty="0"/>
-                        <a:t>…</a:t>
-                      </a:r>
-                    </a:p>
-                  </a:txBody>
-                  <a:tcPr/>
-                </a:tc>
-                <a:tc>
-                  <a:txBody>
-                    <a:bodyPr/>
-                    <a:lstStyle/>
-                    <a:p>
-                      <a:r>
-                        <a:rPr lang="en-GB" dirty="0"/>
-                        <a:t>Lots</a:t>
-                      </a:r>
-                    </a:p>
-                  </a:txBody>
-                  <a:tcPr/>
-                </a:tc>
-                <a:tc>
-                  <a:txBody>
-                    <a:bodyPr/>
-                    <a:lstStyle/>
-                    <a:p>
-                      <a:endParaRPr lang="en-GB" dirty="0"/>
-                    </a:p>
-                  </a:txBody>
-                  <a:tcPr/>
-                </a:tc>
-                <a:tc>
-                  <a:txBody>
-                    <a:bodyPr/>
-                    <a:lstStyle/>
-                    <a:p>
-                      <a:r>
-                        <a:rPr lang="en-GB" dirty="0"/>
-                        <a:t>Lots</a:t>
-                      </a:r>
-                    </a:p>
-                  </a:txBody>
-                  <a:tcPr/>
-                </a:tc>
-                <a:extLst>
-                  <a:ext uri="{0D108BD9-81ED-4DB2-BD59-A6C34878D82A}">
-                    <a16:rowId xmlns:a16="http://schemas.microsoft.com/office/drawing/2014/main" val="974157527"/>
-                  </a:ext>
-                </a:extLst>
-              </a:tr>
-              <a:tr h="370840">
-                <a:tc>
-                  <a:txBody>
-                    <a:bodyPr/>
-                    <a:lstStyle/>
-                    <a:p>
-                      <a:r>
-                        <a:rPr lang="en-GB" dirty="0"/>
-                        <a:t>Monkey</a:t>
-                      </a:r>
-                    </a:p>
-                  </a:txBody>
-                  <a:tcPr/>
-                </a:tc>
-                <a:tc>
-                  <a:txBody>
-                    <a:bodyPr/>
-                    <a:lstStyle/>
-                    <a:p>
-                      <a:r>
-                        <a:rPr lang="en-GB" dirty="0"/>
-                        <a:t>None</a:t>
-                      </a:r>
-                    </a:p>
-                  </a:txBody>
-                  <a:tcPr/>
-                </a:tc>
-                <a:tc>
-                  <a:txBody>
-                    <a:bodyPr/>
-                    <a:lstStyle/>
-                    <a:p>
-                      <a:r>
-                        <a:rPr lang="en-GB" dirty="0"/>
-                        <a:t>Little</a:t>
-                      </a:r>
-                    </a:p>
-                  </a:txBody>
-                  <a:tcPr/>
-                </a:tc>
-                <a:tc>
-                  <a:txBody>
-                    <a:bodyPr/>
-                    <a:lstStyle/>
-                    <a:p>
-                      <a:r>
-                        <a:rPr lang="en-GB" dirty="0"/>
-                        <a:t>…</a:t>
-                      </a:r>
-                    </a:p>
-                  </a:txBody>
-                  <a:tcPr/>
-                </a:tc>
-                <a:tc>
-                  <a:txBody>
-                    <a:bodyPr/>
-                    <a:lstStyle/>
-                    <a:p>
-                      <a:r>
-                        <a:rPr lang="en-GB" dirty="0"/>
-                        <a:t>Little</a:t>
-                      </a:r>
-                    </a:p>
-                  </a:txBody>
-                  <a:tcPr/>
-                </a:tc>
-                <a:tc>
-                  <a:txBody>
-                    <a:bodyPr/>
-                    <a:lstStyle/>
-                    <a:p>
-                      <a:endParaRPr lang="en-GB" dirty="0"/>
-                    </a:p>
-                  </a:txBody>
-                  <a:tcPr/>
-                </a:tc>
-                <a:tc>
-                  <a:txBody>
-                    <a:bodyPr/>
-                    <a:lstStyle/>
-                    <a:p>
-                      <a:r>
-                        <a:rPr lang="en-GB" dirty="0"/>
-                        <a:t>Medium</a:t>
-                      </a:r>
-                    </a:p>
-                  </a:txBody>
-                  <a:tcPr/>
-                </a:tc>
-                <a:extLst>
-                  <a:ext uri="{0D108BD9-81ED-4DB2-BD59-A6C34878D82A}">
-                    <a16:rowId xmlns:a16="http://schemas.microsoft.com/office/drawing/2014/main" val="3997001806"/>
-                  </a:ext>
-                </a:extLst>
-              </a:tr>
-              <a:tr h="370840">
-                <a:tc>
-                  <a:txBody>
-                    <a:bodyPr/>
-                    <a:lstStyle/>
-                    <a:p>
-                      <a:r>
-                        <a:rPr lang="en-GB" dirty="0"/>
-                        <a:t>Rat</a:t>
-                      </a:r>
-                    </a:p>
-                  </a:txBody>
-                  <a:tcPr/>
-                </a:tc>
-                <a:tc>
-                  <a:txBody>
-                    <a:bodyPr/>
-                    <a:lstStyle/>
-                    <a:p>
-                      <a:r>
-                        <a:rPr lang="en-GB" dirty="0"/>
-                        <a:t>None</a:t>
-                      </a:r>
-                    </a:p>
-                  </a:txBody>
-                  <a:tcPr/>
-                </a:tc>
-                <a:tc>
-                  <a:txBody>
-                    <a:bodyPr/>
-                    <a:lstStyle/>
-                    <a:p>
-                      <a:r>
-                        <a:rPr lang="en-GB" dirty="0"/>
-                        <a:t>None</a:t>
-                      </a:r>
-                    </a:p>
-                  </a:txBody>
-                  <a:tcPr/>
-                </a:tc>
-                <a:tc>
-                  <a:txBody>
-                    <a:bodyPr/>
-                    <a:lstStyle/>
-                    <a:p>
-                      <a:r>
-                        <a:rPr lang="en-GB" dirty="0"/>
-                        <a:t>…</a:t>
-                      </a:r>
-                    </a:p>
-                  </a:txBody>
-                  <a:tcPr/>
-                </a:tc>
-                <a:tc>
-                  <a:txBody>
-                    <a:bodyPr/>
-                    <a:lstStyle/>
-                    <a:p>
-                      <a:r>
-                        <a:rPr lang="en-GB" dirty="0"/>
-                        <a:t>Medium</a:t>
-                      </a:r>
-                    </a:p>
-                  </a:txBody>
-                  <a:tcPr/>
-                </a:tc>
-                <a:tc>
-                  <a:txBody>
-                    <a:bodyPr/>
-                    <a:lstStyle/>
-                    <a:p>
-                      <a:endParaRPr lang="en-GB" dirty="0"/>
-                    </a:p>
-                  </a:txBody>
-                  <a:tcPr/>
-                </a:tc>
-                <a:tc>
-                  <a:txBody>
-                    <a:bodyPr/>
-                    <a:lstStyle/>
-                    <a:p>
-                      <a:r>
-                        <a:rPr lang="en-GB" dirty="0"/>
-                        <a:t>Disaster</a:t>
-                      </a:r>
-                    </a:p>
-                  </a:txBody>
-                  <a:tcPr/>
-                </a:tc>
-                <a:extLst>
-                  <a:ext uri="{0D108BD9-81ED-4DB2-BD59-A6C34878D82A}">
-                    <a16:rowId xmlns:a16="http://schemas.microsoft.com/office/drawing/2014/main" val="483455453"/>
-                  </a:ext>
-                </a:extLst>
-              </a:tr>
-            </a:tbl>
-          </a:graphicData>
-        </a:graphic>
-      </p:graphicFrame>
-      <p:graphicFrame>
-        <p:nvGraphicFramePr>
-          <p:cNvPr id="4" name="Table 3">
+        </p:nvSpPr>
+        <p:spPr/>
+        <p:txBody>
+          <a:bodyPr/>
+          <a:lstStyle/>
+          <a:p>
+            <a:r>
+              <a:rPr lang="en-GB" dirty="0"/>
+              <a:t>By using an interaction:</a:t>
+            </a:r>
+          </a:p>
+          <a:p>
+            <a:r>
+              <a:rPr lang="en-GB" dirty="0"/>
+              <a:t>Each species’ intercept can still be different</a:t>
+            </a:r>
+          </a:p>
+          <a:p>
+            <a:r>
+              <a:rPr lang="en-GB" dirty="0"/>
+              <a:t>But the relationship with density can also be species specific</a:t>
+            </a:r>
+          </a:p>
+        </p:txBody>
+      </p:sp>
+      <p:pic>
+        <p:nvPicPr>
+          <p:cNvPr id="6" name="Picture Placeholder 5" descr="A graph with colored lines&#10;&#10;Description automatically generated">
             <a:extLst>
               <a:ext uri="{FF2B5EF4-FFF2-40B4-BE49-F238E27FC236}">
-                <a16:creationId xmlns:a16="http://schemas.microsoft.com/office/drawing/2014/main" id="{82C20A44-3FA5-52F0-795D-816B3ACC1DDC}"/>
+                <a16:creationId xmlns:a16="http://schemas.microsoft.com/office/drawing/2014/main" id="{A3D29917-BE5C-316C-A4BA-787A8CE66FF0}"/>
               </a:ext>
             </a:extLst>
           </p:cNvPr>
-          <p:cNvGraphicFramePr>
-            <a:graphicFrameLocks noGrp="1"/>
-          </p:cNvGraphicFramePr>
+          <p:cNvPicPr>
+            <a:picLocks noGrp="1" noChangeAspect="1"/>
+          </p:cNvPicPr>
           <p:nvPr>
-            <p:extLst>
-              <p:ext uri="{D42A27DB-BD31-4B8C-83A1-F6EECF244321}">
-                <p14:modId xmlns:p14="http://schemas.microsoft.com/office/powerpoint/2010/main" val="3581363933"/>
-              </p:ext>
-            </p:extLst>
+            <p:ph type="pic" sz="quarter" idx="10"/>
           </p:nvPr>
-        </p:nvGraphicFramePr>
-        <p:xfrm>
-          <a:off x="2280356" y="4207933"/>
-          <a:ext cx="7631288" cy="2225040"/>
-        </p:xfrm>
-        <a:graphic>
-          <a:graphicData uri="http://schemas.openxmlformats.org/drawingml/2006/table">
-            <a:tbl>
-              <a:tblPr firstRow="1" bandRow="1">
-                <a:tableStyleId>{5C22544A-7EE6-4342-B048-85BDC9FD1C3A}</a:tableStyleId>
-              </a:tblPr>
-              <a:tblGrid>
-                <a:gridCol w="1090184">
-                  <a:extLst>
-                    <a:ext uri="{9D8B030D-6E8A-4147-A177-3AD203B41FA5}">
-                      <a16:colId xmlns:a16="http://schemas.microsoft.com/office/drawing/2014/main" val="1160138373"/>
-                    </a:ext>
-                  </a:extLst>
-                </a:gridCol>
-                <a:gridCol w="1090184">
-                  <a:extLst>
-                    <a:ext uri="{9D8B030D-6E8A-4147-A177-3AD203B41FA5}">
-                      <a16:colId xmlns:a16="http://schemas.microsoft.com/office/drawing/2014/main" val="3384200162"/>
-                    </a:ext>
-                  </a:extLst>
-                </a:gridCol>
-                <a:gridCol w="1090184">
-                  <a:extLst>
-                    <a:ext uri="{9D8B030D-6E8A-4147-A177-3AD203B41FA5}">
-                      <a16:colId xmlns:a16="http://schemas.microsoft.com/office/drawing/2014/main" val="2488011330"/>
-                    </a:ext>
-                  </a:extLst>
-                </a:gridCol>
-                <a:gridCol w="1090184">
-                  <a:extLst>
-                    <a:ext uri="{9D8B030D-6E8A-4147-A177-3AD203B41FA5}">
-                      <a16:colId xmlns:a16="http://schemas.microsoft.com/office/drawing/2014/main" val="4086487555"/>
-                    </a:ext>
-                  </a:extLst>
-                </a:gridCol>
-                <a:gridCol w="1090184">
-                  <a:extLst>
-                    <a:ext uri="{9D8B030D-6E8A-4147-A177-3AD203B41FA5}">
-                      <a16:colId xmlns:a16="http://schemas.microsoft.com/office/drawing/2014/main" val="3776727704"/>
-                    </a:ext>
-                  </a:extLst>
-                </a:gridCol>
-                <a:gridCol w="1090184">
-                  <a:extLst>
-                    <a:ext uri="{9D8B030D-6E8A-4147-A177-3AD203B41FA5}">
-                      <a16:colId xmlns:a16="http://schemas.microsoft.com/office/drawing/2014/main" val="224713647"/>
-                    </a:ext>
-                  </a:extLst>
-                </a:gridCol>
-                <a:gridCol w="1090184">
-                  <a:extLst>
-                    <a:ext uri="{9D8B030D-6E8A-4147-A177-3AD203B41FA5}">
-                      <a16:colId xmlns:a16="http://schemas.microsoft.com/office/drawing/2014/main" val="377761171"/>
-                    </a:ext>
-                  </a:extLst>
-                </a:gridCol>
-              </a:tblGrid>
-              <a:tr h="370840">
-                <a:tc>
-                  <a:txBody>
-                    <a:bodyPr/>
-                    <a:lstStyle/>
-                    <a:p>
-                      <a:endParaRPr lang="en-GB"/>
-                    </a:p>
-                  </a:txBody>
-                  <a:tcPr/>
-                </a:tc>
-                <a:tc gridSpan="6">
-                  <a:txBody>
-                    <a:bodyPr/>
-                    <a:lstStyle/>
-                    <a:p>
-                      <a:pPr algn="ctr"/>
-                      <a:r>
-                        <a:rPr lang="en-GB" dirty="0"/>
-                        <a:t>Spectrum of density (continuous)</a:t>
-                      </a:r>
-                    </a:p>
-                  </a:txBody>
-                  <a:tcPr/>
-                </a:tc>
-                <a:tc hMerge="1">
-                  <a:txBody>
-                    <a:bodyPr/>
-                    <a:lstStyle/>
-                    <a:p>
-                      <a:endParaRPr lang="en-GB" dirty="0"/>
-                    </a:p>
-                  </a:txBody>
-                  <a:tcPr/>
-                </a:tc>
-                <a:tc hMerge="1">
-                  <a:txBody>
-                    <a:bodyPr/>
-                    <a:lstStyle/>
-                    <a:p>
-                      <a:endParaRPr lang="en-GB" dirty="0"/>
-                    </a:p>
-                  </a:txBody>
-                  <a:tcPr/>
-                </a:tc>
-                <a:tc hMerge="1">
-                  <a:txBody>
-                    <a:bodyPr/>
-                    <a:lstStyle/>
-                    <a:p>
-                      <a:endParaRPr lang="en-GB" dirty="0"/>
-                    </a:p>
-                  </a:txBody>
-                  <a:tcPr/>
-                </a:tc>
-                <a:tc hMerge="1">
-                  <a:txBody>
-                    <a:bodyPr/>
-                    <a:lstStyle/>
-                    <a:p>
-                      <a:endParaRPr lang="en-GB" dirty="0"/>
-                    </a:p>
-                  </a:txBody>
-                  <a:tcPr/>
-                </a:tc>
-                <a:tc hMerge="1">
-                  <a:txBody>
-                    <a:bodyPr/>
-                    <a:lstStyle/>
-                    <a:p>
-                      <a:endParaRPr lang="en-GB" dirty="0"/>
-                    </a:p>
-                  </a:txBody>
-                  <a:tcPr/>
-                </a:tc>
-                <a:extLst>
-                  <a:ext uri="{0D108BD9-81ED-4DB2-BD59-A6C34878D82A}">
-                    <a16:rowId xmlns:a16="http://schemas.microsoft.com/office/drawing/2014/main" val="359118433"/>
-                  </a:ext>
-                </a:extLst>
-              </a:tr>
-              <a:tr h="370840">
-                <a:tc>
-                  <a:txBody>
-                    <a:bodyPr/>
-                    <a:lstStyle/>
-                    <a:p>
-                      <a:endParaRPr lang="en-GB"/>
-                    </a:p>
-                  </a:txBody>
-                  <a:tcPr/>
-                </a:tc>
-                <a:tc>
-                  <a:txBody>
-                    <a:bodyPr/>
-                    <a:lstStyle/>
-                    <a:p>
-                      <a:r>
-                        <a:rPr lang="en-GB" dirty="0"/>
-                        <a:t>0</a:t>
-                      </a:r>
-                    </a:p>
-                  </a:txBody>
-                  <a:tcPr/>
-                </a:tc>
-                <a:tc>
-                  <a:txBody>
-                    <a:bodyPr/>
-                    <a:lstStyle/>
-                    <a:p>
-                      <a:r>
-                        <a:rPr lang="en-GB" dirty="0"/>
-                        <a:t>1</a:t>
-                      </a:r>
-                    </a:p>
-                  </a:txBody>
-                  <a:tcPr/>
-                </a:tc>
-                <a:tc>
-                  <a:txBody>
-                    <a:bodyPr/>
-                    <a:lstStyle/>
-                    <a:p>
-                      <a:r>
-                        <a:rPr lang="en-GB" dirty="0"/>
-                        <a:t>…</a:t>
-                      </a:r>
-                    </a:p>
-                  </a:txBody>
-                  <a:tcPr/>
-                </a:tc>
-                <a:tc>
-                  <a:txBody>
-                    <a:bodyPr/>
-                    <a:lstStyle/>
-                    <a:p>
-                      <a:r>
-                        <a:rPr lang="en-GB" dirty="0"/>
-                        <a:t>10</a:t>
-                      </a:r>
-                    </a:p>
-                  </a:txBody>
-                  <a:tcPr/>
-                </a:tc>
-                <a:tc>
-                  <a:txBody>
-                    <a:bodyPr/>
-                    <a:lstStyle/>
-                    <a:p>
-                      <a:r>
-                        <a:rPr lang="en-GB" dirty="0"/>
-                        <a:t>…</a:t>
-                      </a:r>
-                    </a:p>
-                  </a:txBody>
-                  <a:tcPr/>
-                </a:tc>
-                <a:tc>
-                  <a:txBody>
-                    <a:bodyPr/>
-                    <a:lstStyle/>
-                    <a:p>
-                      <a:r>
-                        <a:rPr lang="en-GB" dirty="0"/>
-                        <a:t>100</a:t>
-                      </a:r>
-                    </a:p>
-                  </a:txBody>
-                  <a:tcPr/>
-                </a:tc>
-                <a:extLst>
-                  <a:ext uri="{0D108BD9-81ED-4DB2-BD59-A6C34878D82A}">
-                    <a16:rowId xmlns:a16="http://schemas.microsoft.com/office/drawing/2014/main" val="2596269973"/>
-                  </a:ext>
-                </a:extLst>
-              </a:tr>
-              <a:tr h="370840">
-                <a:tc>
-                  <a:txBody>
-                    <a:bodyPr/>
-                    <a:lstStyle/>
-                    <a:p>
-                      <a:r>
-                        <a:rPr lang="en-GB" dirty="0"/>
-                        <a:t>Boar</a:t>
-                      </a:r>
-                    </a:p>
-                  </a:txBody>
-                  <a:tcPr/>
-                </a:tc>
-                <a:tc>
-                  <a:txBody>
-                    <a:bodyPr/>
-                    <a:lstStyle/>
-                    <a:p>
-                      <a:r>
-                        <a:rPr lang="en-GB" dirty="0"/>
-                        <a:t>0</a:t>
-                      </a:r>
-                    </a:p>
-                  </a:txBody>
-                  <a:tcPr/>
-                </a:tc>
-                <a:tc>
-                  <a:txBody>
-                    <a:bodyPr/>
-                    <a:lstStyle/>
-                    <a:p>
-                      <a:r>
-                        <a:rPr lang="en-GB" dirty="0"/>
-                        <a:t>2.5</a:t>
-                      </a:r>
-                    </a:p>
-                  </a:txBody>
-                  <a:tcPr/>
-                </a:tc>
-                <a:tc>
-                  <a:txBody>
-                    <a:bodyPr/>
-                    <a:lstStyle/>
-                    <a:p>
-                      <a:r>
-                        <a:rPr lang="en-GB" dirty="0"/>
-                        <a:t>…</a:t>
-                      </a:r>
-                    </a:p>
-                  </a:txBody>
-                  <a:tcPr/>
-                </a:tc>
-                <a:tc>
-                  <a:txBody>
-                    <a:bodyPr/>
-                    <a:lstStyle/>
-                    <a:p>
-                      <a:r>
-                        <a:rPr lang="en-GB" dirty="0"/>
-                        <a:t>6.8</a:t>
-                      </a:r>
-                    </a:p>
-                  </a:txBody>
-                  <a:tcPr/>
-                </a:tc>
-                <a:tc>
-                  <a:txBody>
-                    <a:bodyPr/>
-                    <a:lstStyle/>
-                    <a:p>
-                      <a:r>
-                        <a:rPr lang="en-GB" dirty="0"/>
-                        <a:t>…</a:t>
-                      </a:r>
-                    </a:p>
-                  </a:txBody>
-                  <a:tcPr/>
-                </a:tc>
-                <a:tc>
-                  <a:txBody>
-                    <a:bodyPr/>
-                    <a:lstStyle/>
-                    <a:p>
-                      <a:r>
-                        <a:rPr lang="en-GB" dirty="0"/>
-                        <a:t>10.6</a:t>
-                      </a:r>
-                    </a:p>
-                  </a:txBody>
-                  <a:tcPr/>
-                </a:tc>
-                <a:extLst>
-                  <a:ext uri="{0D108BD9-81ED-4DB2-BD59-A6C34878D82A}">
-                    <a16:rowId xmlns:a16="http://schemas.microsoft.com/office/drawing/2014/main" val="714287132"/>
-                  </a:ext>
-                </a:extLst>
-              </a:tr>
-              <a:tr h="370840">
-                <a:tc>
-                  <a:txBody>
-                    <a:bodyPr/>
-                    <a:lstStyle/>
-                    <a:p>
-                      <a:r>
-                        <a:rPr lang="en-GB" dirty="0"/>
-                        <a:t>Deer</a:t>
-                      </a:r>
-                    </a:p>
-                  </a:txBody>
-                  <a:tcPr/>
-                </a:tc>
-                <a:tc>
-                  <a:txBody>
-                    <a:bodyPr/>
-                    <a:lstStyle/>
-                    <a:p>
-                      <a:r>
-                        <a:rPr lang="en-GB" dirty="0"/>
-                        <a:t>0</a:t>
-                      </a:r>
-                    </a:p>
-                  </a:txBody>
-                  <a:tcPr/>
-                </a:tc>
-                <a:tc>
-                  <a:txBody>
-                    <a:bodyPr/>
-                    <a:lstStyle/>
-                    <a:p>
-                      <a:r>
-                        <a:rPr lang="en-GB" dirty="0"/>
-                        <a:t>1.2</a:t>
-                      </a:r>
-                    </a:p>
-                  </a:txBody>
-                  <a:tcPr/>
-                </a:tc>
-                <a:tc>
-                  <a:txBody>
-                    <a:bodyPr/>
-                    <a:lstStyle/>
-                    <a:p>
-                      <a:r>
-                        <a:rPr lang="en-GB" dirty="0"/>
-                        <a:t>…</a:t>
-                      </a:r>
-                    </a:p>
-                  </a:txBody>
-                  <a:tcPr/>
-                </a:tc>
-                <a:tc>
-                  <a:txBody>
-                    <a:bodyPr/>
-                    <a:lstStyle/>
-                    <a:p>
-                      <a:r>
-                        <a:rPr lang="en-GB" dirty="0"/>
-                        <a:t>2.3</a:t>
-                      </a:r>
-                    </a:p>
-                  </a:txBody>
-                  <a:tcPr/>
-                </a:tc>
-                <a:tc>
-                  <a:txBody>
-                    <a:bodyPr/>
-                    <a:lstStyle/>
-                    <a:p>
-                      <a:r>
-                        <a:rPr lang="en-GB" dirty="0"/>
-                        <a:t>…</a:t>
-                      </a:r>
-                    </a:p>
-                  </a:txBody>
-                  <a:tcPr/>
-                </a:tc>
-                <a:tc>
-                  <a:txBody>
-                    <a:bodyPr/>
-                    <a:lstStyle/>
-                    <a:p>
-                      <a:r>
-                        <a:rPr lang="en-GB" dirty="0"/>
-                        <a:t>3.3</a:t>
-                      </a:r>
-                    </a:p>
-                  </a:txBody>
-                  <a:tcPr/>
-                </a:tc>
-                <a:extLst>
-                  <a:ext uri="{0D108BD9-81ED-4DB2-BD59-A6C34878D82A}">
-                    <a16:rowId xmlns:a16="http://schemas.microsoft.com/office/drawing/2014/main" val="974157527"/>
-                  </a:ext>
-                </a:extLst>
-              </a:tr>
-              <a:tr h="370840">
-                <a:tc>
-                  <a:txBody>
-                    <a:bodyPr/>
-                    <a:lstStyle/>
-                    <a:p>
-                      <a:r>
-                        <a:rPr lang="en-GB" dirty="0"/>
-                        <a:t>Monkey</a:t>
-                      </a:r>
-                    </a:p>
-                  </a:txBody>
-                  <a:tcPr/>
-                </a:tc>
-                <a:tc>
-                  <a:txBody>
-                    <a:bodyPr/>
-                    <a:lstStyle/>
-                    <a:p>
-                      <a:r>
-                        <a:rPr lang="en-GB" dirty="0"/>
-                        <a:t>0</a:t>
-                      </a:r>
-                    </a:p>
-                  </a:txBody>
-                  <a:tcPr/>
-                </a:tc>
-                <a:tc>
-                  <a:txBody>
-                    <a:bodyPr/>
-                    <a:lstStyle/>
-                    <a:p>
-                      <a:r>
-                        <a:rPr lang="en-GB" dirty="0"/>
-                        <a:t>0.3</a:t>
-                      </a:r>
-                    </a:p>
-                  </a:txBody>
-                  <a:tcPr/>
-                </a:tc>
-                <a:tc>
-                  <a:txBody>
-                    <a:bodyPr/>
-                    <a:lstStyle/>
-                    <a:p>
-                      <a:r>
-                        <a:rPr lang="en-GB" dirty="0"/>
-                        <a:t>…</a:t>
-                      </a:r>
-                    </a:p>
-                  </a:txBody>
-                  <a:tcPr/>
-                </a:tc>
-                <a:tc>
-                  <a:txBody>
-                    <a:bodyPr/>
-                    <a:lstStyle/>
-                    <a:p>
-                      <a:r>
-                        <a:rPr lang="en-GB" dirty="0"/>
-                        <a:t>0.4</a:t>
-                      </a:r>
-                    </a:p>
-                  </a:txBody>
-                  <a:tcPr/>
-                </a:tc>
-                <a:tc>
-                  <a:txBody>
-                    <a:bodyPr/>
-                    <a:lstStyle/>
-                    <a:p>
-                      <a:r>
-                        <a:rPr lang="en-GB" dirty="0"/>
-                        <a:t>…</a:t>
-                      </a:r>
-                    </a:p>
-                  </a:txBody>
-                  <a:tcPr/>
-                </a:tc>
-                <a:tc>
-                  <a:txBody>
-                    <a:bodyPr/>
-                    <a:lstStyle/>
-                    <a:p>
-                      <a:r>
-                        <a:rPr lang="en-GB" dirty="0"/>
-                        <a:t>0.9</a:t>
-                      </a:r>
-                    </a:p>
-                  </a:txBody>
-                  <a:tcPr/>
-                </a:tc>
-                <a:extLst>
-                  <a:ext uri="{0D108BD9-81ED-4DB2-BD59-A6C34878D82A}">
-                    <a16:rowId xmlns:a16="http://schemas.microsoft.com/office/drawing/2014/main" val="3997001806"/>
-                  </a:ext>
-                </a:extLst>
-              </a:tr>
-              <a:tr h="370840">
-                <a:tc>
-                  <a:txBody>
-                    <a:bodyPr/>
-                    <a:lstStyle/>
-                    <a:p>
-                      <a:r>
-                        <a:rPr lang="en-GB" dirty="0"/>
-                        <a:t>Rat</a:t>
-                      </a:r>
-                    </a:p>
-                  </a:txBody>
-                  <a:tcPr/>
-                </a:tc>
-                <a:tc>
-                  <a:txBody>
-                    <a:bodyPr/>
-                    <a:lstStyle/>
-                    <a:p>
-                      <a:r>
-                        <a:rPr lang="en-GB" dirty="0"/>
-                        <a:t>0</a:t>
-                      </a:r>
-                    </a:p>
-                  </a:txBody>
-                  <a:tcPr/>
-                </a:tc>
-                <a:tc>
-                  <a:txBody>
-                    <a:bodyPr/>
-                    <a:lstStyle/>
-                    <a:p>
-                      <a:r>
-                        <a:rPr lang="en-GB" dirty="0"/>
-                        <a:t>0</a:t>
-                      </a:r>
-                    </a:p>
-                  </a:txBody>
-                  <a:tcPr/>
-                </a:tc>
-                <a:tc>
-                  <a:txBody>
-                    <a:bodyPr/>
-                    <a:lstStyle/>
-                    <a:p>
-                      <a:r>
-                        <a:rPr lang="en-GB" dirty="0"/>
-                        <a:t>…</a:t>
-                      </a:r>
-                    </a:p>
-                  </a:txBody>
-                  <a:tcPr/>
-                </a:tc>
-                <a:tc>
-                  <a:txBody>
-                    <a:bodyPr/>
-                    <a:lstStyle/>
-                    <a:p>
-                      <a:r>
-                        <a:rPr lang="en-GB" dirty="0"/>
-                        <a:t>8.5</a:t>
-                      </a:r>
-                    </a:p>
-                  </a:txBody>
-                  <a:tcPr/>
-                </a:tc>
-                <a:tc>
-                  <a:txBody>
-                    <a:bodyPr/>
-                    <a:lstStyle/>
-                    <a:p>
-                      <a:r>
-                        <a:rPr lang="en-GB" dirty="0"/>
-                        <a:t>…</a:t>
-                      </a:r>
-                    </a:p>
-                  </a:txBody>
-                  <a:tcPr/>
-                </a:tc>
-                <a:tc>
-                  <a:txBody>
-                    <a:bodyPr/>
-                    <a:lstStyle/>
-                    <a:p>
-                      <a:r>
-                        <a:rPr lang="en-GB" dirty="0"/>
-                        <a:t>15.3</a:t>
-                      </a:r>
-                    </a:p>
-                  </a:txBody>
-                  <a:tcPr/>
-                </a:tc>
-                <a:extLst>
-                  <a:ext uri="{0D108BD9-81ED-4DB2-BD59-A6C34878D82A}">
-                    <a16:rowId xmlns:a16="http://schemas.microsoft.com/office/drawing/2014/main" val="483455453"/>
-                  </a:ext>
-                </a:extLst>
-              </a:tr>
-            </a:tbl>
-          </a:graphicData>
-        </a:graphic>
-      </p:graphicFrame>
+        </p:nvPicPr>
+        <p:blipFill>
+          <a:blip r:embed="rId3">
+            <a:extLst>
+              <a:ext uri="{28A0092B-C50C-407E-A947-70E740481C1C}">
+                <a14:useLocalDpi xmlns:a14="http://schemas.microsoft.com/office/drawing/2010/main" val="0"/>
+              </a:ext>
+            </a:extLst>
+          </a:blip>
+          <a:srcRect t="691" b="691"/>
+          <a:stretch>
+            <a:fillRect/>
+          </a:stretch>
+        </p:blipFill>
+        <p:spPr/>
+      </p:pic>
     </p:spTree>
     <p:extLst>
       <p:ext uri="{BB962C8B-B14F-4D97-AF65-F5344CB8AC3E}">
-        <p14:creationId xmlns:p14="http://schemas.microsoft.com/office/powerpoint/2010/main" val="2003665136"/>
+        <p14:creationId xmlns:p14="http://schemas.microsoft.com/office/powerpoint/2010/main" val="566937801"/>
       </p:ext>
     </p:extLst>
   </p:cSld>
   <p:clrMapOvr>
     <a:masterClrMapping/>
   </p:clrMapOvr>
-  <mc:AlternateContent xmlns:mc="http://schemas.openxmlformats.org/markup-compatibility/2006" xmlns:p14="http://schemas.microsoft.com/office/powerpoint/2010/main">
-    <mc:Choice Requires="p14">
-      <p:transition spd="med" p14:dur="700">
-        <p:fade/>
-      </p:transition>
-    </mc:Choice>
-    <mc:Fallback xmlns="">
-      <p:transition spd="med">
-        <p:fade/>
-      </p:transition>
-    </mc:Fallback>
-  </mc:AlternateContent>
+  <p:timing>
+    <p:tnLst>
+      <p:par>
+        <p:cTn id="1" dur="indefinite" restart="never" nodeType="tmRoot">
+          <p:childTnLst>
+            <p:seq concurrent="1" nextAc="seek">
+              <p:cTn id="2" dur="indefinite" nodeType="mainSeq">
+                <p:childTnLst>
+                  <p:par>
+                    <p:cTn id="3" fill="hold">
+                      <p:stCondLst>
+                        <p:cond delay="indefinite"/>
+                      </p:stCondLst>
+                      <p:childTnLst>
+                        <p:par>
+                          <p:cTn id="4" fill="hold">
+                            <p:stCondLst>
+                              <p:cond delay="0"/>
+                            </p:stCondLst>
+                            <p:childTnLst>
+                              <p:par>
+                                <p:cTn id="5" presetID="10" presetClass="entr" presetSubtype="0" fill="hold" grpId="0" nodeType="clickEffect">
+                                  <p:stCondLst>
+                                    <p:cond delay="0"/>
+                                  </p:stCondLst>
+                                  <p:childTnLst>
+                                    <p:set>
+                                      <p:cBhvr>
+                                        <p:cTn id="6" dur="1" fill="hold">
+                                          <p:stCondLst>
+                                            <p:cond delay="0"/>
+                                          </p:stCondLst>
+                                        </p:cTn>
+                                        <p:tgtEl>
+                                          <p:spTgt spid="3">
+                                            <p:txEl>
+                                              <p:pRg st="0" end="0"/>
+                                            </p:txEl>
+                                          </p:spTgt>
+                                        </p:tgtEl>
+                                        <p:attrNameLst>
+                                          <p:attrName>style.visibility</p:attrName>
+                                        </p:attrNameLst>
+                                      </p:cBhvr>
+                                      <p:to>
+                                        <p:strVal val="visible"/>
+                                      </p:to>
+                                    </p:set>
+                                    <p:animEffect transition="in" filter="fade">
+                                      <p:cBhvr>
+                                        <p:cTn id="7" dur="500"/>
+                                        <p:tgtEl>
+                                          <p:spTgt spid="3">
+                                            <p:txEl>
+                                              <p:pRg st="0" end="0"/>
+                                            </p:txEl>
+                                          </p:spTgt>
+                                        </p:tgtEl>
+                                      </p:cBhvr>
+                                    </p:animEffect>
+                                  </p:childTnLst>
+                                </p:cTn>
+                              </p:par>
+                            </p:childTnLst>
+                          </p:cTn>
+                        </p:par>
+                      </p:childTnLst>
+                    </p:cTn>
+                  </p:par>
+                  <p:par>
+                    <p:cTn id="8" fill="hold">
+                      <p:stCondLst>
+                        <p:cond delay="indefinite"/>
+                      </p:stCondLst>
+                      <p:childTnLst>
+                        <p:par>
+                          <p:cTn id="9" fill="hold">
+                            <p:stCondLst>
+                              <p:cond delay="0"/>
+                            </p:stCondLst>
+                            <p:childTnLst>
+                              <p:par>
+                                <p:cTn id="10" presetID="10" presetClass="entr" presetSubtype="0" fill="hold" grpId="0" nodeType="clickEffect">
+                                  <p:stCondLst>
+                                    <p:cond delay="0"/>
+                                  </p:stCondLst>
+                                  <p:childTnLst>
+                                    <p:set>
+                                      <p:cBhvr>
+                                        <p:cTn id="11" dur="1" fill="hold">
+                                          <p:stCondLst>
+                                            <p:cond delay="0"/>
+                                          </p:stCondLst>
+                                        </p:cTn>
+                                        <p:tgtEl>
+                                          <p:spTgt spid="3">
+                                            <p:txEl>
+                                              <p:pRg st="1" end="1"/>
+                                            </p:txEl>
+                                          </p:spTgt>
+                                        </p:tgtEl>
+                                        <p:attrNameLst>
+                                          <p:attrName>style.visibility</p:attrName>
+                                        </p:attrNameLst>
+                                      </p:cBhvr>
+                                      <p:to>
+                                        <p:strVal val="visible"/>
+                                      </p:to>
+                                    </p:set>
+                                    <p:animEffect transition="in" filter="fade">
+                                      <p:cBhvr>
+                                        <p:cTn id="12" dur="500"/>
+                                        <p:tgtEl>
+                                          <p:spTgt spid="3">
+                                            <p:txEl>
+                                              <p:pRg st="1" end="1"/>
+                                            </p:txEl>
+                                          </p:spTgt>
+                                        </p:tgtEl>
+                                      </p:cBhvr>
+                                    </p:animEffect>
+                                  </p:childTnLst>
+                                </p:cTn>
+                              </p:par>
+                            </p:childTnLst>
+                          </p:cTn>
+                        </p:par>
+                      </p:childTnLst>
+                    </p:cTn>
+                  </p:par>
+                  <p:par>
+                    <p:cTn id="13" fill="hold">
+                      <p:stCondLst>
+                        <p:cond delay="indefinite"/>
+                      </p:stCondLst>
+                      <p:childTnLst>
+                        <p:par>
+                          <p:cTn id="14" fill="hold">
+                            <p:stCondLst>
+                              <p:cond delay="0"/>
+                            </p:stCondLst>
+                            <p:childTnLst>
+                              <p:par>
+                                <p:cTn id="15" presetID="10" presetClass="entr" presetSubtype="0" fill="hold" grpId="0" nodeType="clickEffect">
+                                  <p:stCondLst>
+                                    <p:cond delay="0"/>
+                                  </p:stCondLst>
+                                  <p:childTnLst>
+                                    <p:set>
+                                      <p:cBhvr>
+                                        <p:cTn id="16" dur="1" fill="hold">
+                                          <p:stCondLst>
+                                            <p:cond delay="0"/>
+                                          </p:stCondLst>
+                                        </p:cTn>
+                                        <p:tgtEl>
+                                          <p:spTgt spid="3">
+                                            <p:txEl>
+                                              <p:pRg st="2" end="2"/>
+                                            </p:txEl>
+                                          </p:spTgt>
+                                        </p:tgtEl>
+                                        <p:attrNameLst>
+                                          <p:attrName>style.visibility</p:attrName>
+                                        </p:attrNameLst>
+                                      </p:cBhvr>
+                                      <p:to>
+                                        <p:strVal val="visible"/>
+                                      </p:to>
+                                    </p:set>
+                                    <p:animEffect transition="in" filter="fade">
+                                      <p:cBhvr>
+                                        <p:cTn id="17" dur="500"/>
+                                        <p:tgtEl>
+                                          <p:spTgt spid="3">
+                                            <p:txEl>
+                                              <p:pRg st="2" end="2"/>
+                                            </p:txEl>
+                                          </p:spTgt>
+                                        </p:tgtEl>
+                                      </p:cBhvr>
+                                    </p:animEffect>
+                                  </p:childTnLst>
+                                </p:cTn>
+                              </p:par>
+                            </p:childTnLst>
+                          </p:cTn>
+                        </p:par>
+                      </p:childTnLst>
+                    </p:cTn>
+                  </p:par>
+                  <p:par>
+                    <p:cTn id="18" fill="hold">
+                      <p:stCondLst>
+                        <p:cond delay="indefinite"/>
+                      </p:stCondLst>
+                      <p:childTnLst>
+                        <p:par>
+                          <p:cTn id="19" fill="hold">
+                            <p:stCondLst>
+                              <p:cond delay="0"/>
+                            </p:stCondLst>
+                            <p:childTnLst>
+                              <p:par>
+                                <p:cTn id="20" presetID="10" presetClass="entr" presetSubtype="0" fill="hold" nodeType="clickEffect">
+                                  <p:stCondLst>
+                                    <p:cond delay="0"/>
+                                  </p:stCondLst>
+                                  <p:childTnLst>
+                                    <p:set>
+                                      <p:cBhvr>
+                                        <p:cTn id="21" dur="1" fill="hold">
+                                          <p:stCondLst>
+                                            <p:cond delay="0"/>
+                                          </p:stCondLst>
+                                        </p:cTn>
+                                        <p:tgtEl>
+                                          <p:spTgt spid="6"/>
+                                        </p:tgtEl>
+                                        <p:attrNameLst>
+                                          <p:attrName>style.visibility</p:attrName>
+                                        </p:attrNameLst>
+                                      </p:cBhvr>
+                                      <p:to>
+                                        <p:strVal val="visible"/>
+                                      </p:to>
+                                    </p:set>
+                                    <p:animEffect transition="in" filter="fade">
+                                      <p:cBhvr>
+                                        <p:cTn id="22" dur="500"/>
+                                        <p:tgtEl>
+                                          <p:spTgt spid="6"/>
+                                        </p:tgtEl>
+                                      </p:cBhvr>
+                                    </p:animEffect>
+                                  </p:childTnLst>
+                                </p:cTn>
+                              </p:par>
+                            </p:childTnLst>
+                          </p:cTn>
+                        </p:par>
+                      </p:childTnLst>
+                    </p:cTn>
+                  </p:par>
+                </p:childTnLst>
+              </p:cTn>
+              <p:prevCondLst>
+                <p:cond evt="onPrev" delay="0">
+                  <p:tgtEl>
+                    <p:sldTgt/>
+                  </p:tgtEl>
+                </p:cond>
+              </p:prevCondLst>
+              <p:nextCondLst>
+                <p:cond evt="onNext" delay="0">
+                  <p:tgtEl>
+                    <p:sldTgt/>
+                  </p:tgtEl>
+                </p:cond>
+              </p:nextCondLst>
+            </p:seq>
+          </p:childTnLst>
+        </p:cTn>
+      </p:par>
+    </p:tnLst>
+    <p:bldLst>
+      <p:bldP spid="3" grpId="0" build="p"/>
+    </p:bldLst>
+  </p:timing>
 </p:sld>
 </file>
 
@@ -14346,6 +12972,730 @@
           <p:cNvPr id="2" name="Title 1">
             <a:extLst>
               <a:ext uri="{FF2B5EF4-FFF2-40B4-BE49-F238E27FC236}">
+                <a16:creationId xmlns:a16="http://schemas.microsoft.com/office/drawing/2014/main" id="{184A4D39-1888-8CDE-A91A-22D0FB2C6450}"/>
+              </a:ext>
+            </a:extLst>
+          </p:cNvPr>
+          <p:cNvSpPr>
+            <a:spLocks noGrp="1"/>
+          </p:cNvSpPr>
+          <p:nvPr>
+            <p:ph type="title"/>
+          </p:nvPr>
+        </p:nvSpPr>
+        <p:spPr/>
+        <p:txBody>
+          <a:bodyPr/>
+          <a:lstStyle/>
+          <a:p>
+            <a:r>
+              <a:rPr lang="en-GB" dirty="0"/>
+              <a:t>The data</a:t>
+            </a:r>
+          </a:p>
+        </p:txBody>
+      </p:sp>
+      <p:sp>
+        <p:nvSpPr>
+          <p:cNvPr id="3" name="Content Placeholder 2">
+            <a:extLst>
+              <a:ext uri="{FF2B5EF4-FFF2-40B4-BE49-F238E27FC236}">
+                <a16:creationId xmlns:a16="http://schemas.microsoft.com/office/drawing/2014/main" id="{4AA25DA0-7071-25C5-3BB5-6DD47A8729AA}"/>
+              </a:ext>
+            </a:extLst>
+          </p:cNvPr>
+          <p:cNvSpPr>
+            <a:spLocks noGrp="1"/>
+          </p:cNvSpPr>
+          <p:nvPr>
+            <p:ph idx="1"/>
+          </p:nvPr>
+        </p:nvSpPr>
+        <p:spPr/>
+        <p:txBody>
+          <a:bodyPr/>
+          <a:lstStyle/>
+          <a:p>
+            <a:r>
+              <a:rPr lang="en-GB" dirty="0"/>
+              <a:t>As always with EDA:</a:t>
+            </a:r>
+          </a:p>
+          <a:p>
+            <a:pPr lvl="1"/>
+            <a:r>
+              <a:rPr lang="en-GB" dirty="0"/>
+              <a:t>Notice anything weird?</a:t>
+            </a:r>
+          </a:p>
+          <a:p>
+            <a:pPr lvl="1"/>
+            <a:r>
+              <a:rPr lang="en-GB" dirty="0"/>
+              <a:t>Any surprises or concerns?</a:t>
+            </a:r>
+          </a:p>
+          <a:p>
+            <a:r>
+              <a:rPr lang="en-GB" dirty="0"/>
+              <a:t>Is this the best way to visualise the data?</a:t>
+            </a:r>
+          </a:p>
+          <a:p>
+            <a:pPr lvl="1"/>
+            <a:r>
+              <a:rPr lang="en-GB" dirty="0"/>
+              <a:t>Our question is if the relationship differs between species</a:t>
+            </a:r>
+          </a:p>
+          <a:p>
+            <a:pPr lvl="1"/>
+            <a:r>
+              <a:rPr lang="en-GB" dirty="0"/>
+              <a:t>We can show this with colour</a:t>
+            </a:r>
+          </a:p>
+          <a:p>
+            <a:pPr lvl="1"/>
+            <a:r>
+              <a:rPr lang="en-GB" dirty="0"/>
+              <a:t>Or with facets (clearer?)</a:t>
+            </a:r>
+          </a:p>
+        </p:txBody>
+      </p:sp>
+      <p:pic>
+        <p:nvPicPr>
+          <p:cNvPr id="10" name="Picture Placeholder 9" descr="A screen shot of a graph&#10;&#10;Description automatically generated">
+            <a:extLst>
+              <a:ext uri="{FF2B5EF4-FFF2-40B4-BE49-F238E27FC236}">
+                <a16:creationId xmlns:a16="http://schemas.microsoft.com/office/drawing/2014/main" id="{1069A9A0-F261-DAFB-197D-780639A6342D}"/>
+              </a:ext>
+            </a:extLst>
+          </p:cNvPr>
+          <p:cNvPicPr>
+            <a:picLocks noGrp="1" noChangeAspect="1"/>
+          </p:cNvPicPr>
+          <p:nvPr>
+            <p:ph type="pic" sz="quarter" idx="10"/>
+          </p:nvPr>
+        </p:nvPicPr>
+        <p:blipFill>
+          <a:blip r:embed="rId3">
+            <a:extLst>
+              <a:ext uri="{28A0092B-C50C-407E-A947-70E740481C1C}">
+                <a14:useLocalDpi xmlns:a14="http://schemas.microsoft.com/office/drawing/2010/main" val="0"/>
+              </a:ext>
+            </a:extLst>
+          </a:blip>
+          <a:srcRect t="691" b="691"/>
+          <a:stretch>
+            <a:fillRect/>
+          </a:stretch>
+        </p:blipFill>
+        <p:spPr/>
+      </p:pic>
+      <p:pic>
+        <p:nvPicPr>
+          <p:cNvPr id="13" name="Picture 12" descr="A screen shot of a graph&#10;&#10;Description automatically generated">
+            <a:extLst>
+              <a:ext uri="{FF2B5EF4-FFF2-40B4-BE49-F238E27FC236}">
+                <a16:creationId xmlns:a16="http://schemas.microsoft.com/office/drawing/2014/main" id="{9655C2CD-DACB-1828-1236-D308F19816B3}"/>
+              </a:ext>
+            </a:extLst>
+          </p:cNvPr>
+          <p:cNvPicPr>
+            <a:picLocks noChangeAspect="1"/>
+          </p:cNvPicPr>
+          <p:nvPr/>
+        </p:nvPicPr>
+        <p:blipFill>
+          <a:blip r:embed="rId4">
+            <a:extLst>
+              <a:ext uri="{28A0092B-C50C-407E-A947-70E740481C1C}">
+                <a14:useLocalDpi xmlns:a14="http://schemas.microsoft.com/office/drawing/2010/main" val="0"/>
+              </a:ext>
+            </a:extLst>
+          </a:blip>
+          <a:stretch>
+            <a:fillRect/>
+          </a:stretch>
+        </p:blipFill>
+        <p:spPr>
+          <a:xfrm>
+            <a:off x="6368856" y="0"/>
+            <a:ext cx="5751871" cy="6858000"/>
+          </a:xfrm>
+          <a:prstGeom prst="rect">
+            <a:avLst/>
+          </a:prstGeom>
+        </p:spPr>
+      </p:pic>
+      <p:pic>
+        <p:nvPicPr>
+          <p:cNvPr id="15" name="Picture 14" descr="A graph of numbers and lines&#10;&#10;Description automatically generated with medium confidence">
+            <a:extLst>
+              <a:ext uri="{FF2B5EF4-FFF2-40B4-BE49-F238E27FC236}">
+                <a16:creationId xmlns:a16="http://schemas.microsoft.com/office/drawing/2014/main" id="{3603C6F9-2614-CDF8-8F11-90D3C4525B1C}"/>
+              </a:ext>
+            </a:extLst>
+          </p:cNvPr>
+          <p:cNvPicPr>
+            <a:picLocks noChangeAspect="1"/>
+          </p:cNvPicPr>
+          <p:nvPr/>
+        </p:nvPicPr>
+        <p:blipFill>
+          <a:blip r:embed="rId5">
+            <a:extLst>
+              <a:ext uri="{28A0092B-C50C-407E-A947-70E740481C1C}">
+                <a14:useLocalDpi xmlns:a14="http://schemas.microsoft.com/office/drawing/2010/main" val="0"/>
+              </a:ext>
+            </a:extLst>
+          </a:blip>
+          <a:stretch>
+            <a:fillRect/>
+          </a:stretch>
+        </p:blipFill>
+        <p:spPr>
+          <a:xfrm>
+            <a:off x="6359525" y="0"/>
+            <a:ext cx="5751871" cy="6858000"/>
+          </a:xfrm>
+          <a:prstGeom prst="rect">
+            <a:avLst/>
+          </a:prstGeom>
+        </p:spPr>
+      </p:pic>
+    </p:spTree>
+    <p:extLst>
+      <p:ext uri="{BB962C8B-B14F-4D97-AF65-F5344CB8AC3E}">
+        <p14:creationId xmlns:p14="http://schemas.microsoft.com/office/powerpoint/2010/main" val="1805810496"/>
+      </p:ext>
+    </p:extLst>
+  </p:cSld>
+  <p:clrMapOvr>
+    <a:masterClrMapping/>
+  </p:clrMapOvr>
+  <p:timing>
+    <p:tnLst>
+      <p:par>
+        <p:cTn id="1" dur="indefinite" restart="never" nodeType="tmRoot">
+          <p:childTnLst>
+            <p:seq concurrent="1" nextAc="seek">
+              <p:cTn id="2" dur="indefinite" nodeType="mainSeq">
+                <p:childTnLst>
+                  <p:par>
+                    <p:cTn id="3" fill="hold">
+                      <p:stCondLst>
+                        <p:cond delay="indefinite"/>
+                      </p:stCondLst>
+                      <p:childTnLst>
+                        <p:par>
+                          <p:cTn id="4" fill="hold">
+                            <p:stCondLst>
+                              <p:cond delay="0"/>
+                            </p:stCondLst>
+                            <p:childTnLst>
+                              <p:par>
+                                <p:cTn id="5" presetID="10" presetClass="entr" presetSubtype="0" fill="hold" grpId="0" nodeType="clickEffect">
+                                  <p:stCondLst>
+                                    <p:cond delay="0"/>
+                                  </p:stCondLst>
+                                  <p:childTnLst>
+                                    <p:set>
+                                      <p:cBhvr>
+                                        <p:cTn id="6" dur="1" fill="hold">
+                                          <p:stCondLst>
+                                            <p:cond delay="0"/>
+                                          </p:stCondLst>
+                                        </p:cTn>
+                                        <p:tgtEl>
+                                          <p:spTgt spid="3">
+                                            <p:txEl>
+                                              <p:pRg st="0" end="0"/>
+                                            </p:txEl>
+                                          </p:spTgt>
+                                        </p:tgtEl>
+                                        <p:attrNameLst>
+                                          <p:attrName>style.visibility</p:attrName>
+                                        </p:attrNameLst>
+                                      </p:cBhvr>
+                                      <p:to>
+                                        <p:strVal val="visible"/>
+                                      </p:to>
+                                    </p:set>
+                                    <p:animEffect transition="in" filter="fade">
+                                      <p:cBhvr>
+                                        <p:cTn id="7" dur="500"/>
+                                        <p:tgtEl>
+                                          <p:spTgt spid="3">
+                                            <p:txEl>
+                                              <p:pRg st="0" end="0"/>
+                                            </p:txEl>
+                                          </p:spTgt>
+                                        </p:tgtEl>
+                                      </p:cBhvr>
+                                    </p:animEffect>
+                                  </p:childTnLst>
+                                </p:cTn>
+                              </p:par>
+                              <p:par>
+                                <p:cTn id="8" presetID="10" presetClass="entr" presetSubtype="0" fill="hold" grpId="0" nodeType="withEffect">
+                                  <p:stCondLst>
+                                    <p:cond delay="0"/>
+                                  </p:stCondLst>
+                                  <p:childTnLst>
+                                    <p:set>
+                                      <p:cBhvr>
+                                        <p:cTn id="9" dur="1" fill="hold">
+                                          <p:stCondLst>
+                                            <p:cond delay="0"/>
+                                          </p:stCondLst>
+                                        </p:cTn>
+                                        <p:tgtEl>
+                                          <p:spTgt spid="3">
+                                            <p:txEl>
+                                              <p:pRg st="1" end="1"/>
+                                            </p:txEl>
+                                          </p:spTgt>
+                                        </p:tgtEl>
+                                        <p:attrNameLst>
+                                          <p:attrName>style.visibility</p:attrName>
+                                        </p:attrNameLst>
+                                      </p:cBhvr>
+                                      <p:to>
+                                        <p:strVal val="visible"/>
+                                      </p:to>
+                                    </p:set>
+                                    <p:animEffect transition="in" filter="fade">
+                                      <p:cBhvr>
+                                        <p:cTn id="10" dur="500"/>
+                                        <p:tgtEl>
+                                          <p:spTgt spid="3">
+                                            <p:txEl>
+                                              <p:pRg st="1" end="1"/>
+                                            </p:txEl>
+                                          </p:spTgt>
+                                        </p:tgtEl>
+                                      </p:cBhvr>
+                                    </p:animEffect>
+                                  </p:childTnLst>
+                                </p:cTn>
+                              </p:par>
+                              <p:par>
+                                <p:cTn id="11" presetID="10" presetClass="entr" presetSubtype="0" fill="hold" grpId="0" nodeType="withEffect">
+                                  <p:stCondLst>
+                                    <p:cond delay="0"/>
+                                  </p:stCondLst>
+                                  <p:childTnLst>
+                                    <p:set>
+                                      <p:cBhvr>
+                                        <p:cTn id="12" dur="1" fill="hold">
+                                          <p:stCondLst>
+                                            <p:cond delay="0"/>
+                                          </p:stCondLst>
+                                        </p:cTn>
+                                        <p:tgtEl>
+                                          <p:spTgt spid="3">
+                                            <p:txEl>
+                                              <p:pRg st="2" end="2"/>
+                                            </p:txEl>
+                                          </p:spTgt>
+                                        </p:tgtEl>
+                                        <p:attrNameLst>
+                                          <p:attrName>style.visibility</p:attrName>
+                                        </p:attrNameLst>
+                                      </p:cBhvr>
+                                      <p:to>
+                                        <p:strVal val="visible"/>
+                                      </p:to>
+                                    </p:set>
+                                    <p:animEffect transition="in" filter="fade">
+                                      <p:cBhvr>
+                                        <p:cTn id="13" dur="500"/>
+                                        <p:tgtEl>
+                                          <p:spTgt spid="3">
+                                            <p:txEl>
+                                              <p:pRg st="2" end="2"/>
+                                            </p:txEl>
+                                          </p:spTgt>
+                                        </p:tgtEl>
+                                      </p:cBhvr>
+                                    </p:animEffect>
+                                  </p:childTnLst>
+                                </p:cTn>
+                              </p:par>
+                            </p:childTnLst>
+                          </p:cTn>
+                        </p:par>
+                      </p:childTnLst>
+                    </p:cTn>
+                  </p:par>
+                  <p:par>
+                    <p:cTn id="14" fill="hold">
+                      <p:stCondLst>
+                        <p:cond delay="indefinite"/>
+                      </p:stCondLst>
+                      <p:childTnLst>
+                        <p:par>
+                          <p:cTn id="15" fill="hold">
+                            <p:stCondLst>
+                              <p:cond delay="0"/>
+                            </p:stCondLst>
+                            <p:childTnLst>
+                              <p:par>
+                                <p:cTn id="16" presetID="10" presetClass="entr" presetSubtype="0" fill="hold" grpId="0" nodeType="clickEffect">
+                                  <p:stCondLst>
+                                    <p:cond delay="0"/>
+                                  </p:stCondLst>
+                                  <p:childTnLst>
+                                    <p:set>
+                                      <p:cBhvr>
+                                        <p:cTn id="17" dur="1" fill="hold">
+                                          <p:stCondLst>
+                                            <p:cond delay="0"/>
+                                          </p:stCondLst>
+                                        </p:cTn>
+                                        <p:tgtEl>
+                                          <p:spTgt spid="3">
+                                            <p:txEl>
+                                              <p:pRg st="3" end="3"/>
+                                            </p:txEl>
+                                          </p:spTgt>
+                                        </p:tgtEl>
+                                        <p:attrNameLst>
+                                          <p:attrName>style.visibility</p:attrName>
+                                        </p:attrNameLst>
+                                      </p:cBhvr>
+                                      <p:to>
+                                        <p:strVal val="visible"/>
+                                      </p:to>
+                                    </p:set>
+                                    <p:animEffect transition="in" filter="fade">
+                                      <p:cBhvr>
+                                        <p:cTn id="18" dur="500"/>
+                                        <p:tgtEl>
+                                          <p:spTgt spid="3">
+                                            <p:txEl>
+                                              <p:pRg st="3" end="3"/>
+                                            </p:txEl>
+                                          </p:spTgt>
+                                        </p:tgtEl>
+                                      </p:cBhvr>
+                                    </p:animEffect>
+                                  </p:childTnLst>
+                                </p:cTn>
+                              </p:par>
+                            </p:childTnLst>
+                          </p:cTn>
+                        </p:par>
+                      </p:childTnLst>
+                    </p:cTn>
+                  </p:par>
+                  <p:par>
+                    <p:cTn id="19" fill="hold">
+                      <p:stCondLst>
+                        <p:cond delay="indefinite"/>
+                      </p:stCondLst>
+                      <p:childTnLst>
+                        <p:par>
+                          <p:cTn id="20" fill="hold">
+                            <p:stCondLst>
+                              <p:cond delay="0"/>
+                            </p:stCondLst>
+                            <p:childTnLst>
+                              <p:par>
+                                <p:cTn id="21" presetID="10" presetClass="entr" presetSubtype="0" fill="hold" grpId="0" nodeType="clickEffect">
+                                  <p:stCondLst>
+                                    <p:cond delay="0"/>
+                                  </p:stCondLst>
+                                  <p:childTnLst>
+                                    <p:set>
+                                      <p:cBhvr>
+                                        <p:cTn id="22" dur="1" fill="hold">
+                                          <p:stCondLst>
+                                            <p:cond delay="0"/>
+                                          </p:stCondLst>
+                                        </p:cTn>
+                                        <p:tgtEl>
+                                          <p:spTgt spid="3">
+                                            <p:txEl>
+                                              <p:pRg st="4" end="4"/>
+                                            </p:txEl>
+                                          </p:spTgt>
+                                        </p:tgtEl>
+                                        <p:attrNameLst>
+                                          <p:attrName>style.visibility</p:attrName>
+                                        </p:attrNameLst>
+                                      </p:cBhvr>
+                                      <p:to>
+                                        <p:strVal val="visible"/>
+                                      </p:to>
+                                    </p:set>
+                                    <p:animEffect transition="in" filter="fade">
+                                      <p:cBhvr>
+                                        <p:cTn id="23" dur="500"/>
+                                        <p:tgtEl>
+                                          <p:spTgt spid="3">
+                                            <p:txEl>
+                                              <p:pRg st="4" end="4"/>
+                                            </p:txEl>
+                                          </p:spTgt>
+                                        </p:tgtEl>
+                                      </p:cBhvr>
+                                    </p:animEffect>
+                                  </p:childTnLst>
+                                </p:cTn>
+                              </p:par>
+                            </p:childTnLst>
+                          </p:cTn>
+                        </p:par>
+                      </p:childTnLst>
+                    </p:cTn>
+                  </p:par>
+                  <p:par>
+                    <p:cTn id="24" fill="hold">
+                      <p:stCondLst>
+                        <p:cond delay="indefinite"/>
+                      </p:stCondLst>
+                      <p:childTnLst>
+                        <p:par>
+                          <p:cTn id="25" fill="hold">
+                            <p:stCondLst>
+                              <p:cond delay="0"/>
+                            </p:stCondLst>
+                            <p:childTnLst>
+                              <p:par>
+                                <p:cTn id="26" presetID="10" presetClass="entr" presetSubtype="0" fill="hold" grpId="0" nodeType="clickEffect">
+                                  <p:stCondLst>
+                                    <p:cond delay="0"/>
+                                  </p:stCondLst>
+                                  <p:childTnLst>
+                                    <p:set>
+                                      <p:cBhvr>
+                                        <p:cTn id="27" dur="1" fill="hold">
+                                          <p:stCondLst>
+                                            <p:cond delay="0"/>
+                                          </p:stCondLst>
+                                        </p:cTn>
+                                        <p:tgtEl>
+                                          <p:spTgt spid="3">
+                                            <p:txEl>
+                                              <p:pRg st="5" end="5"/>
+                                            </p:txEl>
+                                          </p:spTgt>
+                                        </p:tgtEl>
+                                        <p:attrNameLst>
+                                          <p:attrName>style.visibility</p:attrName>
+                                        </p:attrNameLst>
+                                      </p:cBhvr>
+                                      <p:to>
+                                        <p:strVal val="visible"/>
+                                      </p:to>
+                                    </p:set>
+                                    <p:animEffect transition="in" filter="fade">
+                                      <p:cBhvr>
+                                        <p:cTn id="28" dur="500"/>
+                                        <p:tgtEl>
+                                          <p:spTgt spid="3">
+                                            <p:txEl>
+                                              <p:pRg st="5" end="5"/>
+                                            </p:txEl>
+                                          </p:spTgt>
+                                        </p:tgtEl>
+                                      </p:cBhvr>
+                                    </p:animEffect>
+                                  </p:childTnLst>
+                                </p:cTn>
+                              </p:par>
+                              <p:par>
+                                <p:cTn id="29" presetID="10" presetClass="entr" presetSubtype="0" fill="hold" nodeType="withEffect">
+                                  <p:stCondLst>
+                                    <p:cond delay="0"/>
+                                  </p:stCondLst>
+                                  <p:childTnLst>
+                                    <p:set>
+                                      <p:cBhvr>
+                                        <p:cTn id="30" dur="1" fill="hold">
+                                          <p:stCondLst>
+                                            <p:cond delay="0"/>
+                                          </p:stCondLst>
+                                        </p:cTn>
+                                        <p:tgtEl>
+                                          <p:spTgt spid="13"/>
+                                        </p:tgtEl>
+                                        <p:attrNameLst>
+                                          <p:attrName>style.visibility</p:attrName>
+                                        </p:attrNameLst>
+                                      </p:cBhvr>
+                                      <p:to>
+                                        <p:strVal val="visible"/>
+                                      </p:to>
+                                    </p:set>
+                                    <p:animEffect transition="in" filter="fade">
+                                      <p:cBhvr>
+                                        <p:cTn id="31" dur="500"/>
+                                        <p:tgtEl>
+                                          <p:spTgt spid="13"/>
+                                        </p:tgtEl>
+                                      </p:cBhvr>
+                                    </p:animEffect>
+                                  </p:childTnLst>
+                                </p:cTn>
+                              </p:par>
+                            </p:childTnLst>
+                          </p:cTn>
+                        </p:par>
+                      </p:childTnLst>
+                    </p:cTn>
+                  </p:par>
+                  <p:par>
+                    <p:cTn id="32" fill="hold">
+                      <p:stCondLst>
+                        <p:cond delay="indefinite"/>
+                      </p:stCondLst>
+                      <p:childTnLst>
+                        <p:par>
+                          <p:cTn id="33" fill="hold">
+                            <p:stCondLst>
+                              <p:cond delay="0"/>
+                            </p:stCondLst>
+                            <p:childTnLst>
+                              <p:par>
+                                <p:cTn id="34" presetID="10" presetClass="entr" presetSubtype="0" fill="hold" grpId="0" nodeType="clickEffect">
+                                  <p:stCondLst>
+                                    <p:cond delay="0"/>
+                                  </p:stCondLst>
+                                  <p:childTnLst>
+                                    <p:set>
+                                      <p:cBhvr>
+                                        <p:cTn id="35" dur="1" fill="hold">
+                                          <p:stCondLst>
+                                            <p:cond delay="0"/>
+                                          </p:stCondLst>
+                                        </p:cTn>
+                                        <p:tgtEl>
+                                          <p:spTgt spid="3">
+                                            <p:txEl>
+                                              <p:pRg st="6" end="6"/>
+                                            </p:txEl>
+                                          </p:spTgt>
+                                        </p:tgtEl>
+                                        <p:attrNameLst>
+                                          <p:attrName>style.visibility</p:attrName>
+                                        </p:attrNameLst>
+                                      </p:cBhvr>
+                                      <p:to>
+                                        <p:strVal val="visible"/>
+                                      </p:to>
+                                    </p:set>
+                                    <p:animEffect transition="in" filter="fade">
+                                      <p:cBhvr>
+                                        <p:cTn id="36" dur="500"/>
+                                        <p:tgtEl>
+                                          <p:spTgt spid="3">
+                                            <p:txEl>
+                                              <p:pRg st="6" end="6"/>
+                                            </p:txEl>
+                                          </p:spTgt>
+                                        </p:tgtEl>
+                                      </p:cBhvr>
+                                    </p:animEffect>
+                                  </p:childTnLst>
+                                </p:cTn>
+                              </p:par>
+                              <p:par>
+                                <p:cTn id="37" presetID="10" presetClass="entr" presetSubtype="0" fill="hold" nodeType="withEffect">
+                                  <p:stCondLst>
+                                    <p:cond delay="0"/>
+                                  </p:stCondLst>
+                                  <p:childTnLst>
+                                    <p:set>
+                                      <p:cBhvr>
+                                        <p:cTn id="38" dur="1" fill="hold">
+                                          <p:stCondLst>
+                                            <p:cond delay="0"/>
+                                          </p:stCondLst>
+                                        </p:cTn>
+                                        <p:tgtEl>
+                                          <p:spTgt spid="15"/>
+                                        </p:tgtEl>
+                                        <p:attrNameLst>
+                                          <p:attrName>style.visibility</p:attrName>
+                                        </p:attrNameLst>
+                                      </p:cBhvr>
+                                      <p:to>
+                                        <p:strVal val="visible"/>
+                                      </p:to>
+                                    </p:set>
+                                    <p:animEffect transition="in" filter="fade">
+                                      <p:cBhvr>
+                                        <p:cTn id="39" dur="500"/>
+                                        <p:tgtEl>
+                                          <p:spTgt spid="15"/>
+                                        </p:tgtEl>
+                                      </p:cBhvr>
+                                    </p:animEffect>
+                                  </p:childTnLst>
+                                </p:cTn>
+                              </p:par>
+                            </p:childTnLst>
+                          </p:cTn>
+                        </p:par>
+                      </p:childTnLst>
+                    </p:cTn>
+                  </p:par>
+                </p:childTnLst>
+              </p:cTn>
+              <p:prevCondLst>
+                <p:cond evt="onPrev" delay="0">
+                  <p:tgtEl>
+                    <p:sldTgt/>
+                  </p:tgtEl>
+                </p:cond>
+              </p:prevCondLst>
+              <p:nextCondLst>
+                <p:cond evt="onNext" delay="0">
+                  <p:tgtEl>
+                    <p:sldTgt/>
+                  </p:tgtEl>
+                </p:cond>
+              </p:nextCondLst>
+            </p:seq>
+          </p:childTnLst>
+        </p:cTn>
+      </p:par>
+    </p:tnLst>
+    <p:bldLst>
+      <p:bldP spid="3" grpId="0" uiExpand="1" build="p"/>
+    </p:bldLst>
+  </p:timing>
+</p:sld>
+</file>
+
+<file path=ppt/slides/slide5.xml><?xml version="1.0" encoding="utf-8"?>
+<p:sld xmlns:a="http://schemas.openxmlformats.org/drawingml/2006/main" xmlns:r="http://schemas.openxmlformats.org/officeDocument/2006/relationships" xmlns:p="http://schemas.openxmlformats.org/presentationml/2006/main">
+  <p:cSld>
+    <p:spTree>
+      <p:nvGrpSpPr>
+        <p:cNvPr id="1" name=""/>
+        <p:cNvGrpSpPr/>
+        <p:nvPr/>
+      </p:nvGrpSpPr>
+      <p:grpSpPr>
+        <a:xfrm>
+          <a:off x="0" y="0"/>
+          <a:ext cx="0" cy="0"/>
+          <a:chOff x="0" y="0"/>
+          <a:chExt cx="0" cy="0"/>
+        </a:xfrm>
+      </p:grpSpPr>
+      <p:sp>
+        <p:nvSpPr>
+          <p:cNvPr id="2" name="Title 1">
+            <a:extLst>
+              <a:ext uri="{FF2B5EF4-FFF2-40B4-BE49-F238E27FC236}">
                 <a16:creationId xmlns:a16="http://schemas.microsoft.com/office/drawing/2014/main" id="{3ADD91AB-503D-FBDB-97E7-84F446C96678}"/>
               </a:ext>
             </a:extLst>
@@ -14574,31 +13924,37 @@
           </p:sp>
         </mc:Fallback>
       </mc:AlternateContent>
-      <p:sp>
-        <p:nvSpPr>
-          <p:cNvPr id="4" name="Picture Placeholder 3">
+      <p:pic>
+        <p:nvPicPr>
+          <p:cNvPr id="10" name="Picture Placeholder 9" descr="A graph with different colored lines&#10;&#10;Description automatically generated">
             <a:extLst>
               <a:ext uri="{FF2B5EF4-FFF2-40B4-BE49-F238E27FC236}">
-                <a16:creationId xmlns:a16="http://schemas.microsoft.com/office/drawing/2014/main" id="{61E4B165-E52A-53D9-B774-B8F61602754E}"/>
+                <a16:creationId xmlns:a16="http://schemas.microsoft.com/office/drawing/2014/main" id="{11DB3763-6428-C850-CC0F-CCB00556F2FB}"/>
               </a:ext>
             </a:extLst>
           </p:cNvPr>
-          <p:cNvSpPr>
-            <a:spLocks noGrp="1"/>
-          </p:cNvSpPr>
+          <p:cNvPicPr>
+            <a:picLocks noGrp="1" noChangeAspect="1"/>
+          </p:cNvPicPr>
           <p:nvPr>
             <p:ph type="pic" sz="quarter" idx="10"/>
           </p:nvPr>
-        </p:nvSpPr>
+        </p:nvPicPr>
+        <p:blipFill>
+          <a:blip r:embed="rId4">
+            <a:extLst>
+              <a:ext uri="{28A0092B-C50C-407E-A947-70E740481C1C}">
+                <a14:useLocalDpi xmlns:a14="http://schemas.microsoft.com/office/drawing/2010/main" val="0"/>
+              </a:ext>
+            </a:extLst>
+          </a:blip>
+          <a:srcRect t="691" b="691"/>
+          <a:stretch>
+            <a:fillRect/>
+          </a:stretch>
+        </p:blipFill>
         <p:spPr/>
-        <p:txBody>
-          <a:bodyPr/>
-          <a:lstStyle/>
-          <a:p>
-            <a:endParaRPr lang="en-GB"/>
-          </a:p>
-        </p:txBody>
-      </p:sp>
+      </p:pic>
     </p:spTree>
     <p:extLst>
       <p:ext uri="{BB962C8B-B14F-4D97-AF65-F5344CB8AC3E}">
@@ -14764,7 +14120,7 @@
                             </p:stCondLst>
                             <p:childTnLst>
                               <p:par>
-                                <p:cTn id="15" presetID="10" presetClass="entr" presetSubtype="0" fill="hold" grpId="0" nodeType="clickEffect">
+                                <p:cTn id="15" presetID="10" presetClass="entr" presetSubtype="0" fill="hold" nodeType="clickEffect">
                                   <p:stCondLst>
                                     <p:cond delay="0"/>
                                   </p:stCondLst>
@@ -14772,6 +14128,59 @@
                                     <p:set>
                                       <p:cBhvr>
                                         <p:cTn id="16" dur="1" fill="hold">
+                                          <p:stCondLst>
+                                            <p:cond delay="0"/>
+                                          </p:stCondLst>
+                                        </p:cTn>
+                                        <p:tgtEl>
+                                          <p:spTgt spid="10"/>
+                                        </p:tgtEl>
+                                        <p:attrNameLst>
+                                          <p:attrName>style.visibility</p:attrName>
+                                        </p:attrNameLst>
+                                      </p:cBhvr>
+                                      <p:to>
+                                        <p:strVal val="visible"/>
+                                      </p:to>
+                                    </p:set>
+                                    <p:animEffect transition="in" filter="fade">
+                                      <p:cBhvr>
+                                        <p:cTn id="17" dur="500"/>
+                                        <p:tgtEl>
+                                          <p:spTgt spid="10"/>
+                                        </p:tgtEl>
+                                      </p:cBhvr>
+                                    </p:animEffect>
+                                  </p:childTnLst>
+                                </p:cTn>
+                              </p:par>
+                            </p:childTnLst>
+                          </p:cTn>
+                        </p:par>
+                      </p:childTnLst>
+                    </p:cTn>
+                  </p:par>
+                  <p:par>
+                    <p:cTn id="18" fill="hold">
+                      <p:stCondLst>
+                        <p:cond delay="indefinite"/>
+                      </p:stCondLst>
+                      <p:childTnLst>
+                        <p:par>
+                          <p:cTn id="19" fill="hold">
+                            <p:stCondLst>
+                              <p:cond delay="0"/>
+                            </p:stCondLst>
+                            <p:childTnLst>
+                              <p:par>
+                                <p:cTn id="20" presetID="10" presetClass="entr" presetSubtype="0" fill="hold" grpId="0" nodeType="clickEffect">
+                                  <p:stCondLst>
+                                    <p:cond delay="0"/>
+                                  </p:stCondLst>
+                                  <p:childTnLst>
+                                    <p:set>
+                                      <p:cBhvr>
+                                        <p:cTn id="21" dur="1" fill="hold">
                                           <p:stCondLst>
                                             <p:cond delay="0"/>
                                           </p:stCondLst>
@@ -14793,7 +14202,7 @@
                                     </p:set>
                                     <p:animEffect transition="in" filter="fade">
                                       <p:cBhvr>
-                                        <p:cTn id="17" dur="500"/>
+                                        <p:cTn id="22" dur="500"/>
                                         <p:tgtEl>
                                           <p:spTgt spid="3">
                                             <p:txEl>
@@ -14840,7 +14249,7 @@
 </p:sld>
 </file>
 
-<file path=ppt/slides/slide5.xml><?xml version="1.0" encoding="utf-8"?>
+<file path=ppt/slides/slide6.xml><?xml version="1.0" encoding="utf-8"?>
 <p:sld xmlns:a="http://schemas.openxmlformats.org/drawingml/2006/main" xmlns:r="http://schemas.openxmlformats.org/officeDocument/2006/relationships" xmlns:p="http://schemas.openxmlformats.org/presentationml/2006/main">
   <p:cSld>
     <p:spTree>
@@ -15307,7 +14716,7 @@
 </p:sld>
 </file>
 
-<file path=ppt/slides/slide6.xml><?xml version="1.0" encoding="utf-8"?>
+<file path=ppt/slides/slide7.xml><?xml version="1.0" encoding="utf-8"?>
 <p:sld xmlns:a="http://schemas.openxmlformats.org/drawingml/2006/main" xmlns:r="http://schemas.openxmlformats.org/officeDocument/2006/relationships" xmlns:p="http://schemas.openxmlformats.org/presentationml/2006/main">
   <p:cSld>
     <p:spTree>
@@ -15434,223 +14843,6 @@
 </p:sld>
 </file>
 
-<file path=ppt/slides/slide7.xml><?xml version="1.0" encoding="utf-8"?>
-<p:sld xmlns:a="http://schemas.openxmlformats.org/drawingml/2006/main" xmlns:r="http://schemas.openxmlformats.org/officeDocument/2006/relationships" xmlns:p="http://schemas.openxmlformats.org/presentationml/2006/main">
-  <p:cSld>
-    <p:spTree>
-      <p:nvGrpSpPr>
-        <p:cNvPr id="1" name=""/>
-        <p:cNvGrpSpPr/>
-        <p:nvPr/>
-      </p:nvGrpSpPr>
-      <p:grpSpPr>
-        <a:xfrm>
-          <a:off x="0" y="0"/>
-          <a:ext cx="0" cy="0"/>
-          <a:chOff x="0" y="0"/>
-          <a:chExt cx="0" cy="0"/>
-        </a:xfrm>
-      </p:grpSpPr>
-      <p:sp>
-        <p:nvSpPr>
-          <p:cNvPr id="2" name="Title 1">
-            <a:extLst>
-              <a:ext uri="{FF2B5EF4-FFF2-40B4-BE49-F238E27FC236}">
-                <a16:creationId xmlns:a16="http://schemas.microsoft.com/office/drawing/2014/main" id="{94207DF2-8981-6110-14AC-61101BD9B34E}"/>
-              </a:ext>
-            </a:extLst>
-          </p:cNvPr>
-          <p:cNvSpPr>
-            <a:spLocks noGrp="1"/>
-          </p:cNvSpPr>
-          <p:nvPr>
-            <p:ph type="title"/>
-          </p:nvPr>
-        </p:nvSpPr>
-        <p:spPr/>
-        <p:txBody>
-          <a:bodyPr/>
-          <a:lstStyle/>
-          <a:p>
-            <a:r>
-              <a:rPr lang="en-GB" dirty="0"/>
-              <a:t>Is my coffee sweet?</a:t>
-            </a:r>
-          </a:p>
-        </p:txBody>
-      </p:sp>
-      <p:sp>
-        <p:nvSpPr>
-          <p:cNvPr id="3" name="Content Placeholder 2">
-            <a:extLst>
-              <a:ext uri="{FF2B5EF4-FFF2-40B4-BE49-F238E27FC236}">
-                <a16:creationId xmlns:a16="http://schemas.microsoft.com/office/drawing/2014/main" id="{8D680C27-FFFD-52F6-9961-11CF916FE205}"/>
-              </a:ext>
-            </a:extLst>
-          </p:cNvPr>
-          <p:cNvSpPr>
-            <a:spLocks noGrp="1"/>
-          </p:cNvSpPr>
-          <p:nvPr>
-            <p:ph idx="1"/>
-          </p:nvPr>
-        </p:nvSpPr>
-        <p:spPr/>
-        <p:txBody>
-          <a:bodyPr/>
-          <a:lstStyle/>
-          <a:p>
-            <a:r>
-              <a:rPr lang="en-GB" dirty="0"/>
-              <a:t>Using only the following information, tell me if my cup of coffee is sweet or not</a:t>
-            </a:r>
-          </a:p>
-        </p:txBody>
-      </p:sp>
-      <p:sp>
-        <p:nvSpPr>
-          <p:cNvPr id="4" name="Picture Placeholder 3">
-            <a:extLst>
-              <a:ext uri="{FF2B5EF4-FFF2-40B4-BE49-F238E27FC236}">
-                <a16:creationId xmlns:a16="http://schemas.microsoft.com/office/drawing/2014/main" id="{A8A1178C-90B4-6BC1-B81A-5E95D2E9B3A7}"/>
-              </a:ext>
-            </a:extLst>
-          </p:cNvPr>
-          <p:cNvSpPr>
-            <a:spLocks noGrp="1"/>
-          </p:cNvSpPr>
-          <p:nvPr>
-            <p:ph type="pic" sz="quarter" idx="10"/>
-          </p:nvPr>
-        </p:nvSpPr>
-        <p:spPr/>
-        <p:txBody>
-          <a:bodyPr/>
-          <a:lstStyle/>
-          <a:p>
-            <a:endParaRPr lang="en-GB"/>
-          </a:p>
-        </p:txBody>
-      </p:sp>
-    </p:spTree>
-    <p:extLst>
-      <p:ext uri="{BB962C8B-B14F-4D97-AF65-F5344CB8AC3E}">
-        <p14:creationId xmlns:p14="http://schemas.microsoft.com/office/powerpoint/2010/main" val="26586681"/>
-      </p:ext>
-    </p:extLst>
-  </p:cSld>
-  <p:clrMapOvr>
-    <a:masterClrMapping/>
-  </p:clrMapOvr>
-  <mc:AlternateContent xmlns:mc="http://schemas.openxmlformats.org/markup-compatibility/2006" xmlns:p14="http://schemas.microsoft.com/office/powerpoint/2010/main">
-    <mc:Choice Requires="p14">
-      <p:transition spd="med" p14:dur="700">
-        <p:fade/>
-      </p:transition>
-    </mc:Choice>
-    <mc:Fallback xmlns="">
-      <p:transition spd="med">
-        <p:fade/>
-      </p:transition>
-    </mc:Fallback>
-  </mc:AlternateContent>
-  <p:timing>
-    <p:tnLst>
-      <p:par>
-        <p:cTn id="1" dur="indefinite" restart="never" nodeType="tmRoot">
-          <p:childTnLst>
-            <p:seq concurrent="1" nextAc="seek">
-              <p:cTn id="2" dur="indefinite" nodeType="mainSeq">
-                <p:childTnLst>
-                  <p:par>
-                    <p:cTn id="3" fill="hold">
-                      <p:stCondLst>
-                        <p:cond delay="indefinite"/>
-                      </p:stCondLst>
-                      <p:childTnLst>
-                        <p:par>
-                          <p:cTn id="4" fill="hold">
-                            <p:stCondLst>
-                              <p:cond delay="0"/>
-                            </p:stCondLst>
-                            <p:childTnLst>
-                              <p:par>
-                                <p:cTn id="5" presetID="10" presetClass="entr" presetSubtype="0" fill="hold" grpId="0" nodeType="clickEffect">
-                                  <p:stCondLst>
-                                    <p:cond delay="0"/>
-                                  </p:stCondLst>
-                                  <p:childTnLst>
-                                    <p:set>
-                                      <p:cBhvr>
-                                        <p:cTn id="6" dur="1" fill="hold">
-                                          <p:stCondLst>
-                                            <p:cond delay="0"/>
-                                          </p:stCondLst>
-                                        </p:cTn>
-                                        <p:tgtEl>
-                                          <p:spTgt spid="3">
-                                            <p:txEl>
-                                              <p:pRg st="0" end="0"/>
-                                            </p:txEl>
-                                          </p:spTgt>
-                                        </p:tgtEl>
-                                        <p:attrNameLst>
-                                          <p:attrName>style.visibility</p:attrName>
-                                        </p:attrNameLst>
-                                      </p:cBhvr>
-                                      <p:to>
-                                        <p:strVal val="visible"/>
-                                      </p:to>
-                                    </p:set>
-                                    <p:animEffect transition="in" filter="fade">
-                                      <p:cBhvr>
-                                        <p:cTn id="7" dur="500"/>
-                                        <p:tgtEl>
-                                          <p:spTgt spid="3">
-                                            <p:txEl>
-                                              <p:pRg st="0" end="0"/>
-                                            </p:txEl>
-                                          </p:spTgt>
-                                        </p:tgtEl>
-                                      </p:cBhvr>
-                                    </p:animEffect>
-                                  </p:childTnLst>
-                                </p:cTn>
-                              </p:par>
-                            </p:childTnLst>
-                          </p:cTn>
-                        </p:par>
-                      </p:childTnLst>
-                    </p:cTn>
-                  </p:par>
-                </p:childTnLst>
-              </p:cTn>
-              <p:prevCondLst>
-                <p:cond evt="onPrev" delay="0">
-                  <p:tgtEl>
-                    <p:sldTgt/>
-                  </p:tgtEl>
-                </p:cond>
-              </p:prevCondLst>
-              <p:nextCondLst>
-                <p:cond evt="onNext" delay="0">
-                  <p:tgtEl>
-                    <p:sldTgt/>
-                  </p:tgtEl>
-                </p:cond>
-              </p:nextCondLst>
-            </p:seq>
-          </p:childTnLst>
-        </p:cTn>
-      </p:par>
-    </p:tnLst>
-    <p:bldLst>
-      <p:bldP spid="3" grpId="0" build="p"/>
-    </p:bldLst>
-  </p:timing>
-</p:sld>
-</file>
-
 <file path=ppt/slides/slide8.xml><?xml version="1.0" encoding="utf-8"?>
 <p:sld xmlns:a="http://schemas.openxmlformats.org/drawingml/2006/main" xmlns:r="http://schemas.openxmlformats.org/officeDocument/2006/relationships" xmlns:p="http://schemas.openxmlformats.org/presentationml/2006/main">
   <p:cSld>
@@ -15717,13 +14909,9 @@
           <a:bodyPr/>
           <a:lstStyle/>
           <a:p>
-            <a:pPr marL="514350" indent="-514350">
-              <a:buFont typeface="+mj-lt"/>
-              <a:buAutoNum type="arabicPeriod"/>
-            </a:pPr>
             <a:r>
               <a:rPr lang="en-GB" dirty="0"/>
-              <a:t>I stir my coffee with a spoon</a:t>
+              <a:t>Using only the following information, tell me if my cup of coffee is sweet or not</a:t>
             </a:r>
           </a:p>
         </p:txBody>
@@ -15756,7 +14944,7 @@
     </p:spTree>
     <p:extLst>
       <p:ext uri="{BB962C8B-B14F-4D97-AF65-F5344CB8AC3E}">
-        <p14:creationId xmlns:p14="http://schemas.microsoft.com/office/powerpoint/2010/main" val="23773921"/>
+        <p14:creationId xmlns:p14="http://schemas.microsoft.com/office/powerpoint/2010/main" val="26586681"/>
       </p:ext>
     </p:extLst>
   </p:cSld>
@@ -15944,7 +15132,7 @@
             </a:pPr>
             <a:r>
               <a:rPr lang="en-GB" dirty="0"/>
-              <a:t>I add sugar to my coffee</a:t>
+              <a:t>I stir my coffee with a spoon</a:t>
             </a:r>
           </a:p>
         </p:txBody>
@@ -15977,7 +15165,7 @@
     </p:spTree>
     <p:extLst>
       <p:ext uri="{BB962C8B-B14F-4D97-AF65-F5344CB8AC3E}">
-        <p14:creationId xmlns:p14="http://schemas.microsoft.com/office/powerpoint/2010/main" val="2807506647"/>
+        <p14:creationId xmlns:p14="http://schemas.microsoft.com/office/powerpoint/2010/main" val="23773921"/>
       </p:ext>
     </p:extLst>
   </p:cSld>
@@ -15996,6 +15184,100 @@
       </p:transition>
     </mc:Fallback>
   </mc:AlternateContent>
+  <p:timing>
+    <p:tnLst>
+      <p:par>
+        <p:cTn id="1" dur="indefinite" restart="never" nodeType="tmRoot">
+          <p:childTnLst>
+            <p:seq concurrent="1" nextAc="seek">
+              <p:cTn id="2" dur="indefinite" nodeType="mainSeq">
+                <p:childTnLst>
+                  <p:par>
+                    <p:cTn id="3" fill="hold">
+                      <p:stCondLst>
+                        <p:cond delay="indefinite"/>
+                      </p:stCondLst>
+                      <p:childTnLst>
+                        <p:par>
+                          <p:cTn id="4" fill="hold">
+                            <p:stCondLst>
+                              <p:cond delay="0"/>
+                            </p:stCondLst>
+                            <p:childTnLst>
+                              <p:par>
+                                <p:cTn id="5" presetID="10" presetClass="entr" presetSubtype="0" fill="hold" grpId="0" nodeType="clickEffect">
+                                  <p:stCondLst>
+                                    <p:cond delay="0"/>
+                                  </p:stCondLst>
+                                  <p:childTnLst>
+                                    <p:set>
+                                      <p:cBhvr>
+                                        <p:cTn id="6" dur="1" fill="hold">
+                                          <p:stCondLst>
+                                            <p:cond delay="0"/>
+                                          </p:stCondLst>
+                                        </p:cTn>
+                                        <p:tgtEl>
+                                          <p:spTgt spid="3">
+                                            <p:txEl>
+                                              <p:pRg st="0" end="0"/>
+                                            </p:txEl>
+                                          </p:spTgt>
+                                        </p:tgtEl>
+                                        <p:attrNameLst>
+                                          <p:attrName>style.visibility</p:attrName>
+                                        </p:attrNameLst>
+                                      </p:cBhvr>
+                                      <p:to>
+                                        <p:strVal val="visible"/>
+                                      </p:to>
+                                    </p:set>
+                                    <p:animEffect transition="in" filter="fade">
+                                      <p:cBhvr>
+                                        <p:cTn id="7" dur="500"/>
+                                        <p:tgtEl>
+                                          <p:spTgt spid="3">
+                                            <p:txEl>
+                                              <p:pRg st="0" end="0"/>
+                                            </p:txEl>
+                                          </p:spTgt>
+                                        </p:tgtEl>
+                                      </p:cBhvr>
+                                    </p:animEffect>
+                                  </p:childTnLst>
+                                </p:cTn>
+                              </p:par>
+                            </p:childTnLst>
+                          </p:cTn>
+                        </p:par>
+                      </p:childTnLst>
+                    </p:cTn>
+                  </p:par>
+                </p:childTnLst>
+              </p:cTn>
+              <p:prevCondLst>
+                <p:cond evt="onPrev" delay="0">
+                  <p:tgtEl>
+                    <p:sldTgt/>
+                  </p:tgtEl>
+                </p:cond>
+              </p:prevCondLst>
+              <p:nextCondLst>
+                <p:cond evt="onNext" delay="0">
+                  <p:tgtEl>
+                    <p:sldTgt/>
+                  </p:tgtEl>
+                </p:cond>
+              </p:nextCondLst>
+            </p:seq>
+          </p:childTnLst>
+        </p:cTn>
+      </p:par>
+    </p:tnLst>
+    <p:bldLst>
+      <p:bldP spid="3" grpId="0" build="p"/>
+    </p:bldLst>
+  </p:timing>
 </p:sld>
 </file>
 

</xml_diff>